<commit_message>
Update outline.pptx with latest changes
Replaced the outline.pptx file with a new version. The update may include revised slides, content, or formatting changes.
</commit_message>
<xml_diff>
--- a/files/outline.pptx
+++ b/files/outline.pptx
@@ -7,9 +7,6 @@
   <p:sldIdLst>
     <p:sldId id="261" r:id="rId2"/>
     <p:sldId id="262" r:id="rId3"/>
-    <p:sldId id="258" r:id="rId4"/>
-    <p:sldId id="260" r:id="rId5"/>
-    <p:sldId id="257" r:id="rId6"/>
   </p:sldIdLst>
   <p:sldSz cx="12192000" cy="6858000"/>
   <p:notesSz cx="6858000" cy="9144000"/>
@@ -274,7 +271,7 @@
           <a:p>
             <a:fld id="{74480821-8B1D-4CBC-B245-62887687FB7B}" type="datetimeFigureOut">
               <a:rPr lang="ko-KR" altLang="en-US" smtClean="0"/>
-              <a:t>2025-08-07</a:t>
+              <a:t>2025-08-08</a:t>
             </a:fld>
             <a:endParaRPr lang="ko-KR" altLang="en-US"/>
           </a:p>
@@ -472,7 +469,7 @@
           <a:p>
             <a:fld id="{74480821-8B1D-4CBC-B245-62887687FB7B}" type="datetimeFigureOut">
               <a:rPr lang="ko-KR" altLang="en-US" smtClean="0"/>
-              <a:t>2025-08-07</a:t>
+              <a:t>2025-08-08</a:t>
             </a:fld>
             <a:endParaRPr lang="ko-KR" altLang="en-US"/>
           </a:p>
@@ -680,7 +677,7 @@
           <a:p>
             <a:fld id="{74480821-8B1D-4CBC-B245-62887687FB7B}" type="datetimeFigureOut">
               <a:rPr lang="ko-KR" altLang="en-US" smtClean="0"/>
-              <a:t>2025-08-07</a:t>
+              <a:t>2025-08-08</a:t>
             </a:fld>
             <a:endParaRPr lang="ko-KR" altLang="en-US"/>
           </a:p>
@@ -878,7 +875,7 @@
           <a:p>
             <a:fld id="{74480821-8B1D-4CBC-B245-62887687FB7B}" type="datetimeFigureOut">
               <a:rPr lang="ko-KR" altLang="en-US" smtClean="0"/>
-              <a:t>2025-08-07</a:t>
+              <a:t>2025-08-08</a:t>
             </a:fld>
             <a:endParaRPr lang="ko-KR" altLang="en-US"/>
           </a:p>
@@ -1153,7 +1150,7 @@
           <a:p>
             <a:fld id="{74480821-8B1D-4CBC-B245-62887687FB7B}" type="datetimeFigureOut">
               <a:rPr lang="ko-KR" altLang="en-US" smtClean="0"/>
-              <a:t>2025-08-07</a:t>
+              <a:t>2025-08-08</a:t>
             </a:fld>
             <a:endParaRPr lang="ko-KR" altLang="en-US"/>
           </a:p>
@@ -1418,7 +1415,7 @@
           <a:p>
             <a:fld id="{74480821-8B1D-4CBC-B245-62887687FB7B}" type="datetimeFigureOut">
               <a:rPr lang="ko-KR" altLang="en-US" smtClean="0"/>
-              <a:t>2025-08-07</a:t>
+              <a:t>2025-08-08</a:t>
             </a:fld>
             <a:endParaRPr lang="ko-KR" altLang="en-US"/>
           </a:p>
@@ -1830,7 +1827,7 @@
           <a:p>
             <a:fld id="{74480821-8B1D-4CBC-B245-62887687FB7B}" type="datetimeFigureOut">
               <a:rPr lang="ko-KR" altLang="en-US" smtClean="0"/>
-              <a:t>2025-08-07</a:t>
+              <a:t>2025-08-08</a:t>
             </a:fld>
             <a:endParaRPr lang="ko-KR" altLang="en-US"/>
           </a:p>
@@ -1971,7 +1968,7 @@
           <a:p>
             <a:fld id="{74480821-8B1D-4CBC-B245-62887687FB7B}" type="datetimeFigureOut">
               <a:rPr lang="ko-KR" altLang="en-US" smtClean="0"/>
-              <a:t>2025-08-07</a:t>
+              <a:t>2025-08-08</a:t>
             </a:fld>
             <a:endParaRPr lang="ko-KR" altLang="en-US"/>
           </a:p>
@@ -2084,7 +2081,7 @@
           <a:p>
             <a:fld id="{74480821-8B1D-4CBC-B245-62887687FB7B}" type="datetimeFigureOut">
               <a:rPr lang="ko-KR" altLang="en-US" smtClean="0"/>
-              <a:t>2025-08-07</a:t>
+              <a:t>2025-08-08</a:t>
             </a:fld>
             <a:endParaRPr lang="ko-KR" altLang="en-US"/>
           </a:p>
@@ -2395,7 +2392,7 @@
           <a:p>
             <a:fld id="{74480821-8B1D-4CBC-B245-62887687FB7B}" type="datetimeFigureOut">
               <a:rPr lang="ko-KR" altLang="en-US" smtClean="0"/>
-              <a:t>2025-08-07</a:t>
+              <a:t>2025-08-08</a:t>
             </a:fld>
             <a:endParaRPr lang="ko-KR" altLang="en-US"/>
           </a:p>
@@ -2683,7 +2680,7 @@
           <a:p>
             <a:fld id="{74480821-8B1D-4CBC-B245-62887687FB7B}" type="datetimeFigureOut">
               <a:rPr lang="ko-KR" altLang="en-US" smtClean="0"/>
-              <a:t>2025-08-07</a:t>
+              <a:t>2025-08-08</a:t>
             </a:fld>
             <a:endParaRPr lang="ko-KR" altLang="en-US"/>
           </a:p>
@@ -2924,7 +2921,7 @@
           <a:p>
             <a:fld id="{74480821-8B1D-4CBC-B245-62887687FB7B}" type="datetimeFigureOut">
               <a:rPr lang="ko-KR" altLang="en-US" smtClean="0"/>
-              <a:t>2025-08-07</a:t>
+              <a:t>2025-08-08</a:t>
             </a:fld>
             <a:endParaRPr lang="ko-KR" altLang="en-US"/>
           </a:p>
@@ -4309,2523 +4306,6 @@
 </p:sld>
 </file>
 
-<file path=ppt/slides/slide3.xml><?xml version="1.0" encoding="utf-8"?>
-<p:sld xmlns:a="http://schemas.openxmlformats.org/drawingml/2006/main" xmlns:r="http://schemas.openxmlformats.org/officeDocument/2006/relationships" xmlns:p="http://schemas.openxmlformats.org/presentationml/2006/main">
-  <p:cSld>
-    <p:spTree>
-      <p:nvGrpSpPr>
-        <p:cNvPr id="1" name=""/>
-        <p:cNvGrpSpPr/>
-        <p:nvPr/>
-      </p:nvGrpSpPr>
-      <p:grpSpPr>
-        <a:xfrm>
-          <a:off x="0" y="0"/>
-          <a:ext cx="0" cy="0"/>
-          <a:chOff x="0" y="0"/>
-          <a:chExt cx="0" cy="0"/>
-        </a:xfrm>
-      </p:grpSpPr>
-      <p:sp>
-        <p:nvSpPr>
-          <p:cNvPr id="15" name="직사각형 14">
-            <a:extLst>
-              <a:ext uri="{FF2B5EF4-FFF2-40B4-BE49-F238E27FC236}">
-                <a16:creationId xmlns:a16="http://schemas.microsoft.com/office/drawing/2014/main" id="{AC8DA9A0-646D-4BBC-865C-5347AEDE318F}"/>
-              </a:ext>
-            </a:extLst>
-          </p:cNvPr>
-          <p:cNvSpPr/>
-          <p:nvPr/>
-        </p:nvSpPr>
-        <p:spPr>
-          <a:xfrm>
-            <a:off x="0" y="0"/>
-            <a:ext cx="12192000" cy="6858000"/>
-          </a:xfrm>
-          <a:prstGeom prst="rect">
-            <a:avLst/>
-          </a:prstGeom>
-          <a:solidFill>
-            <a:srgbClr val="414042"/>
-          </a:solidFill>
-          <a:ln>
-            <a:noFill/>
-          </a:ln>
-        </p:spPr>
-        <p:style>
-          <a:lnRef idx="2">
-            <a:schemeClr val="accent1">
-              <a:shade val="50000"/>
-            </a:schemeClr>
-          </a:lnRef>
-          <a:fillRef idx="1">
-            <a:schemeClr val="accent1"/>
-          </a:fillRef>
-          <a:effectRef idx="0">
-            <a:schemeClr val="accent1"/>
-          </a:effectRef>
-          <a:fontRef idx="minor">
-            <a:schemeClr val="lt1"/>
-          </a:fontRef>
-        </p:style>
-        <p:txBody>
-          <a:bodyPr rtlCol="0" anchor="ctr"/>
-          <a:lstStyle/>
-          <a:p>
-            <a:pPr algn="ctr"/>
-            <a:endParaRPr lang="ko-KR" altLang="en-US" dirty="0">
-              <a:solidFill>
-                <a:schemeClr val="accent4">
-                  <a:lumMod val="60000"/>
-                  <a:lumOff val="40000"/>
-                </a:schemeClr>
-              </a:solidFill>
-            </a:endParaRPr>
-          </a:p>
-        </p:txBody>
-      </p:sp>
-      <p:sp>
-        <p:nvSpPr>
-          <p:cNvPr id="2" name="TextBox 1">
-            <a:extLst>
-              <a:ext uri="{FF2B5EF4-FFF2-40B4-BE49-F238E27FC236}">
-                <a16:creationId xmlns:a16="http://schemas.microsoft.com/office/drawing/2014/main" id="{2B6A17E4-2DDB-4B93-9576-1F677FD33C74}"/>
-              </a:ext>
-            </a:extLst>
-          </p:cNvPr>
-          <p:cNvSpPr txBox="1"/>
-          <p:nvPr/>
-        </p:nvSpPr>
-        <p:spPr>
-          <a:xfrm>
-            <a:off x="1573945" y="397823"/>
-            <a:ext cx="9044143" cy="707886"/>
-          </a:xfrm>
-          <a:prstGeom prst="rect">
-            <a:avLst/>
-          </a:prstGeom>
-          <a:noFill/>
-        </p:spPr>
-        <p:txBody>
-          <a:bodyPr wrap="none" rtlCol="0">
-            <a:spAutoFit/>
-          </a:bodyPr>
-          <a:lstStyle/>
-          <a:p>
-            <a:pPr algn="ctr"/>
-            <a:r>
-              <a:rPr lang="en-US" altLang="ko-KR" sz="4000" dirty="0">
-                <a:solidFill>
-                  <a:schemeClr val="accent2">
-                    <a:lumMod val="60000"/>
-                    <a:lumOff val="40000"/>
-                  </a:schemeClr>
-                </a:solidFill>
-                <a:latin typeface="태나다체 " panose="02000000000000000000" pitchFamily="2" charset="-127"/>
-                <a:ea typeface="태나다체 " panose="02000000000000000000" pitchFamily="2" charset="-127"/>
-              </a:rPr>
-              <a:t>_process()</a:t>
-            </a:r>
-            <a:r>
-              <a:rPr lang="ko-KR" altLang="en-US" sz="4000" dirty="0">
-                <a:solidFill>
-                  <a:schemeClr val="accent2">
-                    <a:lumMod val="60000"/>
-                    <a:lumOff val="40000"/>
-                  </a:schemeClr>
-                </a:solidFill>
-                <a:latin typeface="태나다체 " panose="02000000000000000000" pitchFamily="2" charset="-127"/>
-                <a:ea typeface="태나다체 " panose="02000000000000000000" pitchFamily="2" charset="-127"/>
-              </a:rPr>
-              <a:t> </a:t>
-            </a:r>
-            <a:r>
-              <a:rPr lang="en-US" altLang="ko-KR" sz="4000" dirty="0">
-                <a:solidFill>
-                  <a:schemeClr val="bg1"/>
-                </a:solidFill>
-                <a:latin typeface="태나다체 " panose="02000000000000000000" pitchFamily="2" charset="-127"/>
-                <a:ea typeface="태나다체 " panose="02000000000000000000" pitchFamily="2" charset="-127"/>
-              </a:rPr>
-              <a:t>vs.</a:t>
-            </a:r>
-            <a:r>
-              <a:rPr lang="ko-KR" altLang="en-US" sz="4000" dirty="0">
-                <a:solidFill>
-                  <a:schemeClr val="accent2">
-                    <a:lumMod val="60000"/>
-                    <a:lumOff val="40000"/>
-                  </a:schemeClr>
-                </a:solidFill>
-                <a:latin typeface="태나다체 " panose="02000000000000000000" pitchFamily="2" charset="-127"/>
-                <a:ea typeface="태나다체 " panose="02000000000000000000" pitchFamily="2" charset="-127"/>
-              </a:rPr>
-              <a:t> </a:t>
-            </a:r>
-            <a:r>
-              <a:rPr lang="en-US" altLang="ko-KR" sz="4000" dirty="0">
-                <a:solidFill>
-                  <a:schemeClr val="accent2">
-                    <a:lumMod val="60000"/>
-                    <a:lumOff val="40000"/>
-                  </a:schemeClr>
-                </a:solidFill>
-                <a:latin typeface="태나다체 " panose="02000000000000000000" pitchFamily="2" charset="-127"/>
-                <a:ea typeface="태나다체 " panose="02000000000000000000" pitchFamily="2" charset="-127"/>
-              </a:rPr>
-              <a:t>_</a:t>
-            </a:r>
-            <a:r>
-              <a:rPr lang="en-US" altLang="ko-KR" sz="4000" dirty="0" err="1">
-                <a:solidFill>
-                  <a:schemeClr val="accent2">
-                    <a:lumMod val="60000"/>
-                    <a:lumOff val="40000"/>
-                  </a:schemeClr>
-                </a:solidFill>
-                <a:latin typeface="태나다체 " panose="02000000000000000000" pitchFamily="2" charset="-127"/>
-                <a:ea typeface="태나다체 " panose="02000000000000000000" pitchFamily="2" charset="-127"/>
-              </a:rPr>
-              <a:t>physics_process</a:t>
-            </a:r>
-            <a:r>
-              <a:rPr lang="en-US" altLang="ko-KR" sz="4000" dirty="0">
-                <a:solidFill>
-                  <a:schemeClr val="accent2">
-                    <a:lumMod val="60000"/>
-                    <a:lumOff val="40000"/>
-                  </a:schemeClr>
-                </a:solidFill>
-                <a:latin typeface="태나다체 " panose="02000000000000000000" pitchFamily="2" charset="-127"/>
-                <a:ea typeface="태나다체 " panose="02000000000000000000" pitchFamily="2" charset="-127"/>
-              </a:rPr>
-              <a:t>()</a:t>
-            </a:r>
-            <a:endParaRPr lang="ko-KR" altLang="en-US" sz="4000" dirty="0">
-              <a:solidFill>
-                <a:schemeClr val="bg1"/>
-              </a:solidFill>
-              <a:latin typeface="태나다체 " panose="02000000000000000000" pitchFamily="2" charset="-127"/>
-              <a:ea typeface="태나다체 " panose="02000000000000000000" pitchFamily="2" charset="-127"/>
-            </a:endParaRPr>
-          </a:p>
-        </p:txBody>
-      </p:sp>
-      <p:pic>
-        <p:nvPicPr>
-          <p:cNvPr id="14" name="그림 13">
-            <a:extLst>
-              <a:ext uri="{FF2B5EF4-FFF2-40B4-BE49-F238E27FC236}">
-                <a16:creationId xmlns:a16="http://schemas.microsoft.com/office/drawing/2014/main" id="{057A1348-A3CE-4DA5-9D84-5DB18862A61E}"/>
-              </a:ext>
-            </a:extLst>
-          </p:cNvPr>
-          <p:cNvPicPr>
-            <a:picLocks noChangeAspect="1"/>
-          </p:cNvPicPr>
-          <p:nvPr/>
-        </p:nvPicPr>
-        <p:blipFill>
-          <a:blip r:embed="rId2">
-            <a:extLst>
-              <a:ext uri="{28A0092B-C50C-407E-A947-70E740481C1C}">
-                <a14:useLocalDpi xmlns:a14="http://schemas.microsoft.com/office/drawing/2010/main" val="0"/>
-              </a:ext>
-            </a:extLst>
-          </a:blip>
-          <a:stretch>
-            <a:fillRect/>
-          </a:stretch>
-        </p:blipFill>
-        <p:spPr>
-          <a:xfrm rot="1835132">
-            <a:off x="-1679702" y="-1168087"/>
-            <a:ext cx="2741223" cy="2741223"/>
-          </a:xfrm>
-          <a:prstGeom prst="rect">
-            <a:avLst/>
-          </a:prstGeom>
-        </p:spPr>
-      </p:pic>
-      <p:pic>
-        <p:nvPicPr>
-          <p:cNvPr id="13" name="그림 12">
-            <a:extLst>
-              <a:ext uri="{FF2B5EF4-FFF2-40B4-BE49-F238E27FC236}">
-                <a16:creationId xmlns:a16="http://schemas.microsoft.com/office/drawing/2014/main" id="{4D86BD98-BEF1-4770-8C54-2A0C065ABC5B}"/>
-              </a:ext>
-            </a:extLst>
-          </p:cNvPr>
-          <p:cNvPicPr>
-            <a:picLocks noChangeAspect="1"/>
-          </p:cNvPicPr>
-          <p:nvPr/>
-        </p:nvPicPr>
-        <p:blipFill>
-          <a:blip r:embed="rId2">
-            <a:extLst>
-              <a:ext uri="{28A0092B-C50C-407E-A947-70E740481C1C}">
-                <a14:useLocalDpi xmlns:a14="http://schemas.microsoft.com/office/drawing/2010/main" val="0"/>
-              </a:ext>
-            </a:extLst>
-          </a:blip>
-          <a:stretch>
-            <a:fillRect/>
-          </a:stretch>
-        </p:blipFill>
-        <p:spPr>
-          <a:xfrm rot="1835132">
-            <a:off x="10618517" y="4947062"/>
-            <a:ext cx="2741223" cy="2741223"/>
-          </a:xfrm>
-          <a:prstGeom prst="rect">
-            <a:avLst/>
-          </a:prstGeom>
-        </p:spPr>
-      </p:pic>
-      <p:sp>
-        <p:nvSpPr>
-          <p:cNvPr id="19" name="TextBox 18">
-            <a:extLst>
-              <a:ext uri="{FF2B5EF4-FFF2-40B4-BE49-F238E27FC236}">
-                <a16:creationId xmlns:a16="http://schemas.microsoft.com/office/drawing/2014/main" id="{284E68B5-0BC1-464B-9E55-5ED284760A63}"/>
-              </a:ext>
-            </a:extLst>
-          </p:cNvPr>
-          <p:cNvSpPr txBox="1"/>
-          <p:nvPr/>
-        </p:nvSpPr>
-        <p:spPr>
-          <a:xfrm>
-            <a:off x="1568230" y="2079844"/>
-            <a:ext cx="2492990" cy="584775"/>
-          </a:xfrm>
-          <a:prstGeom prst="rect">
-            <a:avLst/>
-          </a:prstGeom>
-          <a:noFill/>
-        </p:spPr>
-        <p:txBody>
-          <a:bodyPr wrap="none" rtlCol="0">
-            <a:spAutoFit/>
-          </a:bodyPr>
-          <a:lstStyle/>
-          <a:p>
-            <a:r>
-              <a:rPr lang="ko-KR" altLang="en-US" sz="3200" dirty="0">
-                <a:solidFill>
-                  <a:schemeClr val="accent4">
-                    <a:lumMod val="60000"/>
-                    <a:lumOff val="40000"/>
-                  </a:schemeClr>
-                </a:solidFill>
-                <a:latin typeface="배스킨라빈스 R" panose="02020603020101020101" pitchFamily="18" charset="-127"/>
-                <a:ea typeface="배스킨라빈스 R" panose="02020603020101020101" pitchFamily="18" charset="-127"/>
-              </a:rPr>
-              <a:t>각 메서드 특징</a:t>
-            </a:r>
-          </a:p>
-        </p:txBody>
-      </p:sp>
-      <p:graphicFrame>
-        <p:nvGraphicFramePr>
-          <p:cNvPr id="20" name="표 4">
-            <a:extLst>
-              <a:ext uri="{FF2B5EF4-FFF2-40B4-BE49-F238E27FC236}">
-                <a16:creationId xmlns:a16="http://schemas.microsoft.com/office/drawing/2014/main" id="{0846C89D-2EF1-4BCC-9E24-FF87EC738A75}"/>
-              </a:ext>
-            </a:extLst>
-          </p:cNvPr>
-          <p:cNvGraphicFramePr>
-            <a:graphicFrameLocks noGrp="1"/>
-          </p:cNvGraphicFramePr>
-          <p:nvPr>
-            <p:extLst>
-              <p:ext uri="{D42A27DB-BD31-4B8C-83A1-F6EECF244321}">
-                <p14:modId xmlns:p14="http://schemas.microsoft.com/office/powerpoint/2010/main" val="72986364"/>
-              </p:ext>
-            </p:extLst>
-          </p:nvPr>
-        </p:nvGraphicFramePr>
-        <p:xfrm>
-          <a:off x="1568230" y="2664619"/>
-          <a:ext cx="9049858" cy="2656840"/>
-        </p:xfrm>
-        <a:graphic>
-          <a:graphicData uri="http://schemas.openxmlformats.org/drawingml/2006/table">
-            <a:tbl>
-              <a:tblPr firstRow="1" bandRow="1">
-                <a:tableStyleId>{C083E6E3-FA7D-4D7B-A595-EF9225AFEA82}</a:tableStyleId>
-              </a:tblPr>
-              <a:tblGrid>
-                <a:gridCol w="1616745">
-                  <a:extLst>
-                    <a:ext uri="{9D8B030D-6E8A-4147-A177-3AD203B41FA5}">
-                      <a16:colId xmlns:a16="http://schemas.microsoft.com/office/drawing/2014/main" val="3183162679"/>
-                    </a:ext>
-                  </a:extLst>
-                </a:gridCol>
-                <a:gridCol w="3541502">
-                  <a:extLst>
-                    <a:ext uri="{9D8B030D-6E8A-4147-A177-3AD203B41FA5}">
-                      <a16:colId xmlns:a16="http://schemas.microsoft.com/office/drawing/2014/main" val="3015536629"/>
-                    </a:ext>
-                  </a:extLst>
-                </a:gridCol>
-                <a:gridCol w="3891611">
-                  <a:extLst>
-                    <a:ext uri="{9D8B030D-6E8A-4147-A177-3AD203B41FA5}">
-                      <a16:colId xmlns:a16="http://schemas.microsoft.com/office/drawing/2014/main" val="4266326658"/>
-                    </a:ext>
-                  </a:extLst>
-                </a:gridCol>
-              </a:tblGrid>
-              <a:tr h="370840">
-                <a:tc>
-                  <a:txBody>
-                    <a:bodyPr/>
-                    <a:lstStyle/>
-                    <a:p>
-                      <a:pPr latinLnBrk="1"/>
-                      <a:r>
-                        <a:rPr lang="ko-KR" altLang="en-US" dirty="0">
-                          <a:solidFill>
-                            <a:schemeClr val="accent5">
-                              <a:lumMod val="60000"/>
-                              <a:lumOff val="40000"/>
-                            </a:schemeClr>
-                          </a:solidFill>
-                          <a:latin typeface="배스킨라빈스 R" panose="02020603020101020101" pitchFamily="18" charset="-127"/>
-                          <a:ea typeface="배스킨라빈스 R" panose="02020603020101020101" pitchFamily="18" charset="-127"/>
-                        </a:rPr>
-                        <a:t>항목</a:t>
-                      </a:r>
-                    </a:p>
-                  </a:txBody>
-                  <a:tcPr anchor="ctr"/>
-                </a:tc>
-                <a:tc>
-                  <a:txBody>
-                    <a:bodyPr/>
-                    <a:lstStyle/>
-                    <a:p>
-                      <a:pPr latinLnBrk="1"/>
-                      <a:r>
-                        <a:rPr lang="en-US" altLang="ko-KR" dirty="0">
-                          <a:solidFill>
-                            <a:schemeClr val="accent6">
-                              <a:lumMod val="60000"/>
-                              <a:lumOff val="40000"/>
-                            </a:schemeClr>
-                          </a:solidFill>
-                          <a:latin typeface="배스킨라빈스 R" panose="02020603020101020101" pitchFamily="18" charset="-127"/>
-                          <a:ea typeface="배스킨라빈스 R" panose="02020603020101020101" pitchFamily="18" charset="-127"/>
-                        </a:rPr>
-                        <a:t>_process(delta)</a:t>
-                      </a:r>
-                      <a:endParaRPr lang="ko-KR" altLang="en-US" dirty="0">
-                        <a:solidFill>
-                          <a:schemeClr val="accent6">
-                            <a:lumMod val="60000"/>
-                            <a:lumOff val="40000"/>
-                          </a:schemeClr>
-                        </a:solidFill>
-                        <a:latin typeface="배스킨라빈스 R" panose="02020603020101020101" pitchFamily="18" charset="-127"/>
-                        <a:ea typeface="배스킨라빈스 R" panose="02020603020101020101" pitchFamily="18" charset="-127"/>
-                      </a:endParaRPr>
-                    </a:p>
-                  </a:txBody>
-                  <a:tcPr anchor="ctr"/>
-                </a:tc>
-                <a:tc>
-                  <a:txBody>
-                    <a:bodyPr/>
-                    <a:lstStyle/>
-                    <a:p>
-                      <a:pPr latinLnBrk="1"/>
-                      <a:r>
-                        <a:rPr lang="en-US" altLang="ko-KR" dirty="0">
-                          <a:solidFill>
-                            <a:schemeClr val="accent6">
-                              <a:lumMod val="60000"/>
-                              <a:lumOff val="40000"/>
-                            </a:schemeClr>
-                          </a:solidFill>
-                          <a:latin typeface="배스킨라빈스 R" panose="02020603020101020101" pitchFamily="18" charset="-127"/>
-                          <a:ea typeface="배스킨라빈스 R" panose="02020603020101020101" pitchFamily="18" charset="-127"/>
-                        </a:rPr>
-                        <a:t>_</a:t>
-                      </a:r>
-                      <a:r>
-                        <a:rPr lang="en-US" altLang="ko-KR" dirty="0" err="1">
-                          <a:solidFill>
-                            <a:schemeClr val="accent6">
-                              <a:lumMod val="60000"/>
-                              <a:lumOff val="40000"/>
-                            </a:schemeClr>
-                          </a:solidFill>
-                          <a:latin typeface="배스킨라빈스 R" panose="02020603020101020101" pitchFamily="18" charset="-127"/>
-                          <a:ea typeface="배스킨라빈스 R" panose="02020603020101020101" pitchFamily="18" charset="-127"/>
-                        </a:rPr>
-                        <a:t>physics_process</a:t>
-                      </a:r>
-                      <a:r>
-                        <a:rPr lang="en-US" altLang="ko-KR" dirty="0">
-                          <a:solidFill>
-                            <a:schemeClr val="accent6">
-                              <a:lumMod val="60000"/>
-                              <a:lumOff val="40000"/>
-                            </a:schemeClr>
-                          </a:solidFill>
-                          <a:latin typeface="배스킨라빈스 R" panose="02020603020101020101" pitchFamily="18" charset="-127"/>
-                          <a:ea typeface="배스킨라빈스 R" panose="02020603020101020101" pitchFamily="18" charset="-127"/>
-                        </a:rPr>
-                        <a:t>(delta)</a:t>
-                      </a:r>
-                      <a:endParaRPr lang="ko-KR" altLang="en-US" dirty="0">
-                        <a:solidFill>
-                          <a:schemeClr val="accent6">
-                            <a:lumMod val="60000"/>
-                            <a:lumOff val="40000"/>
-                          </a:schemeClr>
-                        </a:solidFill>
-                        <a:latin typeface="배스킨라빈스 R" panose="02020603020101020101" pitchFamily="18" charset="-127"/>
-                        <a:ea typeface="배스킨라빈스 R" panose="02020603020101020101" pitchFamily="18" charset="-127"/>
-                      </a:endParaRPr>
-                    </a:p>
-                  </a:txBody>
-                  <a:tcPr anchor="ctr"/>
-                </a:tc>
-                <a:extLst>
-                  <a:ext uri="{0D108BD9-81ED-4DB2-BD59-A6C34878D82A}">
-                    <a16:rowId xmlns:a16="http://schemas.microsoft.com/office/drawing/2014/main" val="1431255208"/>
-                  </a:ext>
-                </a:extLst>
-              </a:tr>
-              <a:tr h="370840">
-                <a:tc>
-                  <a:txBody>
-                    <a:bodyPr/>
-                    <a:lstStyle/>
-                    <a:p>
-                      <a:pPr latinLnBrk="1"/>
-                      <a:r>
-                        <a:rPr lang="ko-KR" altLang="en-US" dirty="0">
-                          <a:solidFill>
-                            <a:schemeClr val="accent5">
-                              <a:lumMod val="20000"/>
-                              <a:lumOff val="80000"/>
-                            </a:schemeClr>
-                          </a:solidFill>
-                          <a:latin typeface="배스킨라빈스 R" panose="02020603020101020101" pitchFamily="18" charset="-127"/>
-                          <a:ea typeface="배스킨라빈스 R" panose="02020603020101020101" pitchFamily="18" charset="-127"/>
-                        </a:rPr>
-                        <a:t>호출 주기</a:t>
-                      </a:r>
-                    </a:p>
-                  </a:txBody>
-                  <a:tcPr anchor="ctr"/>
-                </a:tc>
-                <a:tc>
-                  <a:txBody>
-                    <a:bodyPr/>
-                    <a:lstStyle/>
-                    <a:p>
-                      <a:pPr latinLnBrk="1"/>
-                      <a:r>
-                        <a:rPr lang="ko-KR" altLang="en-US" dirty="0" err="1">
-                          <a:solidFill>
-                            <a:schemeClr val="accent6">
-                              <a:lumMod val="20000"/>
-                              <a:lumOff val="80000"/>
-                            </a:schemeClr>
-                          </a:solidFill>
-                          <a:latin typeface="배스킨라빈스 R" panose="02020603020101020101" pitchFamily="18" charset="-127"/>
-                          <a:ea typeface="배스킨라빈스 R" panose="02020603020101020101" pitchFamily="18" charset="-127"/>
-                        </a:rPr>
-                        <a:t>렌더</a:t>
-                      </a:r>
-                      <a:r>
-                        <a:rPr lang="ko-KR" altLang="en-US" dirty="0">
-                          <a:solidFill>
-                            <a:schemeClr val="accent6">
-                              <a:lumMod val="20000"/>
-                              <a:lumOff val="80000"/>
-                            </a:schemeClr>
-                          </a:solidFill>
-                          <a:latin typeface="배스킨라빈스 R" panose="02020603020101020101" pitchFamily="18" charset="-127"/>
-                          <a:ea typeface="배스킨라빈스 R" panose="02020603020101020101" pitchFamily="18" charset="-127"/>
-                        </a:rPr>
-                        <a:t> 프레임마다 호출</a:t>
-                      </a:r>
-                      <a:endParaRPr lang="en-US" altLang="ko-KR" dirty="0">
-                        <a:solidFill>
-                          <a:schemeClr val="accent6">
-                            <a:lumMod val="20000"/>
-                            <a:lumOff val="80000"/>
-                          </a:schemeClr>
-                        </a:solidFill>
-                        <a:latin typeface="배스킨라빈스 R" panose="02020603020101020101" pitchFamily="18" charset="-127"/>
-                        <a:ea typeface="배스킨라빈스 R" panose="02020603020101020101" pitchFamily="18" charset="-127"/>
-                      </a:endParaRPr>
-                    </a:p>
-                    <a:p>
-                      <a:pPr latinLnBrk="1"/>
-                      <a:r>
-                        <a:rPr lang="en-US" altLang="ko-KR" dirty="0">
-                          <a:solidFill>
-                            <a:schemeClr val="accent6">
-                              <a:lumMod val="20000"/>
-                              <a:lumOff val="80000"/>
-                            </a:schemeClr>
-                          </a:solidFill>
-                          <a:latin typeface="배스킨라빈스 R" panose="02020603020101020101" pitchFamily="18" charset="-127"/>
-                          <a:ea typeface="배스킨라빈스 R" panose="02020603020101020101" pitchFamily="18" charset="-127"/>
-                        </a:rPr>
-                        <a:t>(</a:t>
-                      </a:r>
-                      <a:r>
-                        <a:rPr lang="ko-KR" altLang="en-US" dirty="0">
-                          <a:solidFill>
-                            <a:schemeClr val="accent6">
-                              <a:lumMod val="20000"/>
-                              <a:lumOff val="80000"/>
-                            </a:schemeClr>
-                          </a:solidFill>
-                          <a:latin typeface="배스킨라빈스 R" panose="02020603020101020101" pitchFamily="18" charset="-127"/>
-                          <a:ea typeface="배스킨라빈스 R" panose="02020603020101020101" pitchFamily="18" charset="-127"/>
-                        </a:rPr>
-                        <a:t>모니터 주사율에 따라 다름</a:t>
-                      </a:r>
-                      <a:endParaRPr lang="en-US" altLang="ko-KR" dirty="0">
-                        <a:solidFill>
-                          <a:schemeClr val="accent6">
-                            <a:lumMod val="20000"/>
-                            <a:lumOff val="80000"/>
-                          </a:schemeClr>
-                        </a:solidFill>
-                        <a:latin typeface="배스킨라빈스 R" panose="02020603020101020101" pitchFamily="18" charset="-127"/>
-                        <a:ea typeface="배스킨라빈스 R" panose="02020603020101020101" pitchFamily="18" charset="-127"/>
-                      </a:endParaRPr>
-                    </a:p>
-                    <a:p>
-                      <a:pPr latinLnBrk="1"/>
-                      <a:r>
-                        <a:rPr lang="en-US" altLang="ko-KR" dirty="0">
-                          <a:solidFill>
-                            <a:srgbClr val="555456"/>
-                          </a:solidFill>
-                          <a:latin typeface="배스킨라빈스 R" panose="02020603020101020101" pitchFamily="18" charset="-127"/>
-                          <a:ea typeface="배스킨라빈스 R" panose="02020603020101020101" pitchFamily="18" charset="-127"/>
-                        </a:rPr>
-                        <a:t>(</a:t>
-                      </a:r>
-                      <a:r>
-                        <a:rPr lang="ko-KR" altLang="en-US" dirty="0">
-                          <a:solidFill>
-                            <a:schemeClr val="accent6">
-                              <a:lumMod val="20000"/>
-                              <a:lumOff val="80000"/>
-                            </a:schemeClr>
-                          </a:solidFill>
-                          <a:latin typeface="배스킨라빈스 R" panose="02020603020101020101" pitchFamily="18" charset="-127"/>
-                          <a:ea typeface="배스킨라빈스 R" panose="02020603020101020101" pitchFamily="18" charset="-127"/>
-                        </a:rPr>
-                        <a:t>보통 </a:t>
-                      </a:r>
-                      <a:r>
-                        <a:rPr lang="en-US" altLang="ko-KR" dirty="0">
-                          <a:solidFill>
-                            <a:schemeClr val="accent6">
-                              <a:lumMod val="20000"/>
-                              <a:lumOff val="80000"/>
-                            </a:schemeClr>
-                          </a:solidFill>
-                          <a:latin typeface="배스킨라빈스 R" panose="02020603020101020101" pitchFamily="18" charset="-127"/>
-                          <a:ea typeface="배스킨라빈스 R" panose="02020603020101020101" pitchFamily="18" charset="-127"/>
-                        </a:rPr>
-                        <a:t>60~144fps)</a:t>
-                      </a:r>
-                      <a:endParaRPr lang="ko-KR" altLang="en-US" dirty="0">
-                        <a:solidFill>
-                          <a:schemeClr val="accent6">
-                            <a:lumMod val="20000"/>
-                            <a:lumOff val="80000"/>
-                          </a:schemeClr>
-                        </a:solidFill>
-                        <a:latin typeface="배스킨라빈스 R" panose="02020603020101020101" pitchFamily="18" charset="-127"/>
-                        <a:ea typeface="배스킨라빈스 R" panose="02020603020101020101" pitchFamily="18" charset="-127"/>
-                      </a:endParaRPr>
-                    </a:p>
-                  </a:txBody>
-                  <a:tcPr anchor="ctr"/>
-                </a:tc>
-                <a:tc>
-                  <a:txBody>
-                    <a:bodyPr/>
-                    <a:lstStyle/>
-                    <a:p>
-                      <a:pPr latinLnBrk="1"/>
-                      <a:r>
-                        <a:rPr lang="ko-KR" altLang="en-US" dirty="0">
-                          <a:solidFill>
-                            <a:schemeClr val="accent6">
-                              <a:lumMod val="20000"/>
-                              <a:lumOff val="80000"/>
-                            </a:schemeClr>
-                          </a:solidFill>
-                          <a:latin typeface="배스킨라빈스 R" panose="02020603020101020101" pitchFamily="18" charset="-127"/>
-                          <a:ea typeface="배스킨라빈스 R" panose="02020603020101020101" pitchFamily="18" charset="-127"/>
-                        </a:rPr>
-                        <a:t>물리 프레임마다 호출 </a:t>
-                      </a:r>
-                      <a:endParaRPr lang="en-US" altLang="ko-KR" dirty="0">
-                        <a:solidFill>
-                          <a:schemeClr val="accent6">
-                            <a:lumMod val="20000"/>
-                            <a:lumOff val="80000"/>
-                          </a:schemeClr>
-                        </a:solidFill>
-                        <a:latin typeface="배스킨라빈스 R" panose="02020603020101020101" pitchFamily="18" charset="-127"/>
-                        <a:ea typeface="배스킨라빈스 R" panose="02020603020101020101" pitchFamily="18" charset="-127"/>
-                      </a:endParaRPr>
-                    </a:p>
-                    <a:p>
-                      <a:pPr latinLnBrk="1"/>
-                      <a:r>
-                        <a:rPr lang="ko-KR" altLang="en-US" sz="1400" dirty="0">
-                          <a:solidFill>
-                            <a:schemeClr val="bg1">
-                              <a:lumMod val="95000"/>
-                            </a:schemeClr>
-                          </a:solidFill>
-                          <a:highlight>
-                            <a:srgbClr val="000000"/>
-                          </a:highlight>
-                          <a:latin typeface="나눔스퀘어OTF Bold" panose="020B0600000101010101" pitchFamily="34" charset="-127"/>
-                          <a:ea typeface="나눔스퀘어OTF Bold" panose="020B0600000101010101" pitchFamily="34" charset="-127"/>
-                        </a:rPr>
-                        <a:t>기본값</a:t>
-                      </a:r>
-                      <a:r>
-                        <a:rPr lang="en-US" altLang="ko-KR" sz="1400" dirty="0">
-                          <a:solidFill>
-                            <a:schemeClr val="bg1">
-                              <a:lumMod val="95000"/>
-                            </a:schemeClr>
-                          </a:solidFill>
-                          <a:highlight>
-                            <a:srgbClr val="000000"/>
-                          </a:highlight>
-                          <a:latin typeface="나눔스퀘어OTF Bold" panose="020B0600000101010101" pitchFamily="34" charset="-127"/>
-                          <a:ea typeface="나눔스퀘어OTF Bold" panose="020B0600000101010101" pitchFamily="34" charset="-127"/>
-                        </a:rPr>
-                        <a:t>: 60fps, Project Settings &gt; Physics &gt; Common &gt; Physics Ticks Per Second)</a:t>
-                      </a:r>
-                      <a:endParaRPr lang="ko-KR" altLang="en-US" sz="1400" dirty="0">
-                        <a:solidFill>
-                          <a:schemeClr val="bg1">
-                            <a:lumMod val="95000"/>
-                          </a:schemeClr>
-                        </a:solidFill>
-                        <a:highlight>
-                          <a:srgbClr val="000000"/>
-                        </a:highlight>
-                        <a:latin typeface="나눔스퀘어OTF Bold" panose="020B0600000101010101" pitchFamily="34" charset="-127"/>
-                        <a:ea typeface="나눔스퀘어OTF Bold" panose="020B0600000101010101" pitchFamily="34" charset="-127"/>
-                      </a:endParaRPr>
-                    </a:p>
-                  </a:txBody>
-                  <a:tcPr anchor="ctr"/>
-                </a:tc>
-                <a:extLst>
-                  <a:ext uri="{0D108BD9-81ED-4DB2-BD59-A6C34878D82A}">
-                    <a16:rowId xmlns:a16="http://schemas.microsoft.com/office/drawing/2014/main" val="2817348084"/>
-                  </a:ext>
-                </a:extLst>
-              </a:tr>
-              <a:tr h="370840">
-                <a:tc>
-                  <a:txBody>
-                    <a:bodyPr/>
-                    <a:lstStyle/>
-                    <a:p>
-                      <a:pPr latinLnBrk="1"/>
-                      <a:r>
-                        <a:rPr lang="ko-KR" altLang="en-US" dirty="0">
-                          <a:solidFill>
-                            <a:schemeClr val="accent5">
-                              <a:lumMod val="20000"/>
-                              <a:lumOff val="80000"/>
-                            </a:schemeClr>
-                          </a:solidFill>
-                          <a:latin typeface="배스킨라빈스 R" panose="02020603020101020101" pitchFamily="18" charset="-127"/>
-                          <a:ea typeface="배스킨라빈스 R" panose="02020603020101020101" pitchFamily="18" charset="-127"/>
-                        </a:rPr>
-                        <a:t>목적</a:t>
-                      </a:r>
-                    </a:p>
-                  </a:txBody>
-                  <a:tcPr anchor="ctr"/>
-                </a:tc>
-                <a:tc>
-                  <a:txBody>
-                    <a:bodyPr/>
-                    <a:lstStyle/>
-                    <a:p>
-                      <a:pPr latinLnBrk="1"/>
-                      <a:r>
-                        <a:rPr lang="ko-KR" altLang="en-US" dirty="0" err="1">
-                          <a:solidFill>
-                            <a:schemeClr val="accent6">
-                              <a:lumMod val="20000"/>
-                              <a:lumOff val="80000"/>
-                            </a:schemeClr>
-                          </a:solidFill>
-                          <a:latin typeface="배스킨라빈스 R" panose="02020603020101020101" pitchFamily="18" charset="-127"/>
-                          <a:ea typeface="배스킨라빈스 R" panose="02020603020101020101" pitchFamily="18" charset="-127"/>
-                        </a:rPr>
-                        <a:t>비물리</a:t>
-                      </a:r>
-                      <a:r>
-                        <a:rPr lang="ko-KR" altLang="en-US" dirty="0">
-                          <a:solidFill>
-                            <a:schemeClr val="accent6">
-                              <a:lumMod val="20000"/>
-                              <a:lumOff val="80000"/>
-                            </a:schemeClr>
-                          </a:solidFill>
-                          <a:latin typeface="배스킨라빈스 R" panose="02020603020101020101" pitchFamily="18" charset="-127"/>
-                          <a:ea typeface="배스킨라빈스 R" panose="02020603020101020101" pitchFamily="18" charset="-127"/>
-                        </a:rPr>
-                        <a:t> 연산</a:t>
-                      </a:r>
-                      <a:endParaRPr lang="en-US" altLang="ko-KR" dirty="0">
-                        <a:solidFill>
-                          <a:schemeClr val="accent6">
-                            <a:lumMod val="20000"/>
-                            <a:lumOff val="80000"/>
-                          </a:schemeClr>
-                        </a:solidFill>
-                        <a:latin typeface="배스킨라빈스 R" panose="02020603020101020101" pitchFamily="18" charset="-127"/>
-                        <a:ea typeface="배스킨라빈스 R" panose="02020603020101020101" pitchFamily="18" charset="-127"/>
-                      </a:endParaRPr>
-                    </a:p>
-                    <a:p>
-                      <a:pPr latinLnBrk="1"/>
-                      <a:r>
-                        <a:rPr lang="en-US" altLang="ko-KR" dirty="0">
-                          <a:solidFill>
-                            <a:schemeClr val="accent6">
-                              <a:lumMod val="20000"/>
-                              <a:lumOff val="80000"/>
-                            </a:schemeClr>
-                          </a:solidFill>
-                          <a:latin typeface="배스킨라빈스 R" panose="02020603020101020101" pitchFamily="18" charset="-127"/>
-                          <a:ea typeface="배스킨라빈스 R" panose="02020603020101020101" pitchFamily="18" charset="-127"/>
-                        </a:rPr>
-                        <a:t>(</a:t>
-                      </a:r>
-                      <a:r>
-                        <a:rPr lang="ko-KR" altLang="en-US" dirty="0">
-                          <a:solidFill>
-                            <a:schemeClr val="accent6">
-                              <a:lumMod val="20000"/>
-                              <a:lumOff val="80000"/>
-                            </a:schemeClr>
-                          </a:solidFill>
-                          <a:latin typeface="배스킨라빈스 R" panose="02020603020101020101" pitchFamily="18" charset="-127"/>
-                          <a:ea typeface="배스킨라빈스 R" panose="02020603020101020101" pitchFamily="18" charset="-127"/>
-                        </a:rPr>
-                        <a:t>애니메이션</a:t>
-                      </a:r>
-                      <a:r>
-                        <a:rPr lang="en-US" altLang="ko-KR" dirty="0">
-                          <a:solidFill>
-                            <a:schemeClr val="accent6">
-                              <a:lumMod val="20000"/>
-                              <a:lumOff val="80000"/>
-                            </a:schemeClr>
-                          </a:solidFill>
-                          <a:latin typeface="배스킨라빈스 R" panose="02020603020101020101" pitchFamily="18" charset="-127"/>
-                          <a:ea typeface="배스킨라빈스 R" panose="02020603020101020101" pitchFamily="18" charset="-127"/>
-                        </a:rPr>
-                        <a:t>, UI </a:t>
-                      </a:r>
-                      <a:r>
-                        <a:rPr lang="ko-KR" altLang="en-US" dirty="0">
-                          <a:solidFill>
-                            <a:schemeClr val="accent6">
-                              <a:lumMod val="20000"/>
-                              <a:lumOff val="80000"/>
-                            </a:schemeClr>
-                          </a:solidFill>
-                          <a:latin typeface="배스킨라빈스 R" panose="02020603020101020101" pitchFamily="18" charset="-127"/>
-                          <a:ea typeface="배스킨라빈스 R" panose="02020603020101020101" pitchFamily="18" charset="-127"/>
-                        </a:rPr>
-                        <a:t>갱신</a:t>
-                      </a:r>
-                      <a:r>
-                        <a:rPr lang="en-US" altLang="ko-KR" dirty="0">
-                          <a:solidFill>
-                            <a:schemeClr val="accent6">
-                              <a:lumMod val="20000"/>
-                              <a:lumOff val="80000"/>
-                            </a:schemeClr>
-                          </a:solidFill>
-                          <a:latin typeface="배스킨라빈스 R" panose="02020603020101020101" pitchFamily="18" charset="-127"/>
-                          <a:ea typeface="배스킨라빈스 R" panose="02020603020101020101" pitchFamily="18" charset="-127"/>
-                        </a:rPr>
-                        <a:t>, </a:t>
-                      </a:r>
-                      <a:r>
-                        <a:rPr lang="ko-KR" altLang="en-US" dirty="0">
-                          <a:solidFill>
-                            <a:schemeClr val="accent6">
-                              <a:lumMod val="20000"/>
-                              <a:lumOff val="80000"/>
-                            </a:schemeClr>
-                          </a:solidFill>
-                          <a:latin typeface="배스킨라빈스 R" panose="02020603020101020101" pitchFamily="18" charset="-127"/>
-                          <a:ea typeface="배스킨라빈스 R" panose="02020603020101020101" pitchFamily="18" charset="-127"/>
-                        </a:rPr>
-                        <a:t>비주얼 처리 등</a:t>
-                      </a:r>
-                      <a:r>
-                        <a:rPr lang="en-US" altLang="ko-KR" dirty="0">
-                          <a:solidFill>
-                            <a:schemeClr val="accent6">
-                              <a:lumMod val="20000"/>
-                              <a:lumOff val="80000"/>
-                            </a:schemeClr>
-                          </a:solidFill>
-                          <a:latin typeface="배스킨라빈스 R" panose="02020603020101020101" pitchFamily="18" charset="-127"/>
-                          <a:ea typeface="배스킨라빈스 R" panose="02020603020101020101" pitchFamily="18" charset="-127"/>
-                        </a:rPr>
-                        <a:t>)</a:t>
-                      </a:r>
-                      <a:endParaRPr lang="ko-KR" altLang="en-US" dirty="0">
-                        <a:solidFill>
-                          <a:schemeClr val="accent6">
-                            <a:lumMod val="20000"/>
-                            <a:lumOff val="80000"/>
-                          </a:schemeClr>
-                        </a:solidFill>
-                        <a:latin typeface="배스킨라빈스 R" panose="02020603020101020101" pitchFamily="18" charset="-127"/>
-                        <a:ea typeface="배스킨라빈스 R" panose="02020603020101020101" pitchFamily="18" charset="-127"/>
-                      </a:endParaRPr>
-                    </a:p>
-                  </a:txBody>
-                  <a:tcPr anchor="ctr"/>
-                </a:tc>
-                <a:tc>
-                  <a:txBody>
-                    <a:bodyPr/>
-                    <a:lstStyle/>
-                    <a:p>
-                      <a:pPr latinLnBrk="1"/>
-                      <a:r>
-                        <a:rPr lang="ko-KR" altLang="en-US" dirty="0">
-                          <a:solidFill>
-                            <a:schemeClr val="accent6">
-                              <a:lumMod val="20000"/>
-                              <a:lumOff val="80000"/>
-                            </a:schemeClr>
-                          </a:solidFill>
-                          <a:latin typeface="배스킨라빈스 R" panose="02020603020101020101" pitchFamily="18" charset="-127"/>
-                          <a:ea typeface="배스킨라빈스 R" panose="02020603020101020101" pitchFamily="18" charset="-127"/>
-                        </a:rPr>
-                        <a:t>물리 연산 </a:t>
-                      </a:r>
-                      <a:endParaRPr lang="en-US" altLang="ko-KR" dirty="0">
-                        <a:solidFill>
-                          <a:schemeClr val="accent6">
-                            <a:lumMod val="20000"/>
-                            <a:lumOff val="80000"/>
-                          </a:schemeClr>
-                        </a:solidFill>
-                        <a:latin typeface="배스킨라빈스 R" panose="02020603020101020101" pitchFamily="18" charset="-127"/>
-                        <a:ea typeface="배스킨라빈스 R" panose="02020603020101020101" pitchFamily="18" charset="-127"/>
-                      </a:endParaRPr>
-                    </a:p>
-                    <a:p>
-                      <a:pPr latinLnBrk="1"/>
-                      <a:r>
-                        <a:rPr lang="en-US" altLang="ko-KR" dirty="0">
-                          <a:solidFill>
-                            <a:schemeClr val="accent6">
-                              <a:lumMod val="20000"/>
-                              <a:lumOff val="80000"/>
-                            </a:schemeClr>
-                          </a:solidFill>
-                          <a:latin typeface="배스킨라빈스 R" panose="02020603020101020101" pitchFamily="18" charset="-127"/>
-                          <a:ea typeface="배스킨라빈스 R" panose="02020603020101020101" pitchFamily="18" charset="-127"/>
-                        </a:rPr>
-                        <a:t>(</a:t>
-                      </a:r>
-                      <a:r>
-                        <a:rPr lang="ko-KR" altLang="en-US" dirty="0">
-                          <a:solidFill>
-                            <a:schemeClr val="accent6">
-                              <a:lumMod val="20000"/>
-                              <a:lumOff val="80000"/>
-                            </a:schemeClr>
-                          </a:solidFill>
-                          <a:latin typeface="배스킨라빈스 R" panose="02020603020101020101" pitchFamily="18" charset="-127"/>
-                          <a:ea typeface="배스킨라빈스 R" panose="02020603020101020101" pitchFamily="18" charset="-127"/>
-                        </a:rPr>
-                        <a:t>충돌</a:t>
-                      </a:r>
-                      <a:r>
-                        <a:rPr lang="en-US" altLang="ko-KR" dirty="0">
-                          <a:solidFill>
-                            <a:schemeClr val="accent6">
-                              <a:lumMod val="20000"/>
-                              <a:lumOff val="80000"/>
-                            </a:schemeClr>
-                          </a:solidFill>
-                          <a:latin typeface="배스킨라빈스 R" panose="02020603020101020101" pitchFamily="18" charset="-127"/>
-                          <a:ea typeface="배스킨라빈스 R" panose="02020603020101020101" pitchFamily="18" charset="-127"/>
-                        </a:rPr>
-                        <a:t>, </a:t>
-                      </a:r>
-                      <a:r>
-                        <a:rPr lang="ko-KR" altLang="en-US" dirty="0">
-                          <a:solidFill>
-                            <a:schemeClr val="accent6">
-                              <a:lumMod val="20000"/>
-                              <a:lumOff val="80000"/>
-                            </a:schemeClr>
-                          </a:solidFill>
-                          <a:latin typeface="배스킨라빈스 R" panose="02020603020101020101" pitchFamily="18" charset="-127"/>
-                          <a:ea typeface="배스킨라빈스 R" panose="02020603020101020101" pitchFamily="18" charset="-127"/>
-                        </a:rPr>
-                        <a:t>이동</a:t>
-                      </a:r>
-                      <a:r>
-                        <a:rPr lang="en-US" altLang="ko-KR" dirty="0">
-                          <a:solidFill>
-                            <a:schemeClr val="accent6">
-                              <a:lumMod val="20000"/>
-                              <a:lumOff val="80000"/>
-                            </a:schemeClr>
-                          </a:solidFill>
-                          <a:latin typeface="배스킨라빈스 R" panose="02020603020101020101" pitchFamily="18" charset="-127"/>
-                          <a:ea typeface="배스킨라빈스 R" panose="02020603020101020101" pitchFamily="18" charset="-127"/>
-                        </a:rPr>
-                        <a:t>, </a:t>
-                      </a:r>
-                      <a:r>
-                        <a:rPr lang="ko-KR" altLang="en-US" dirty="0">
-                          <a:solidFill>
-                            <a:schemeClr val="accent6">
-                              <a:lumMod val="20000"/>
-                              <a:lumOff val="80000"/>
-                            </a:schemeClr>
-                          </a:solidFill>
-                          <a:latin typeface="배스킨라빈스 R" panose="02020603020101020101" pitchFamily="18" charset="-127"/>
-                          <a:ea typeface="배스킨라빈스 R" panose="02020603020101020101" pitchFamily="18" charset="-127"/>
-                        </a:rPr>
-                        <a:t>속도 계산 등</a:t>
-                      </a:r>
-                      <a:r>
-                        <a:rPr lang="en-US" altLang="ko-KR" dirty="0">
-                          <a:solidFill>
-                            <a:schemeClr val="accent6">
-                              <a:lumMod val="20000"/>
-                              <a:lumOff val="80000"/>
-                            </a:schemeClr>
-                          </a:solidFill>
-                          <a:latin typeface="배스킨라빈스 R" panose="02020603020101020101" pitchFamily="18" charset="-127"/>
-                          <a:ea typeface="배스킨라빈스 R" panose="02020603020101020101" pitchFamily="18" charset="-127"/>
-                        </a:rPr>
-                        <a:t>)</a:t>
-                      </a:r>
-                      <a:endParaRPr lang="ko-KR" altLang="en-US" dirty="0">
-                        <a:solidFill>
-                          <a:schemeClr val="accent6">
-                            <a:lumMod val="20000"/>
-                            <a:lumOff val="80000"/>
-                          </a:schemeClr>
-                        </a:solidFill>
-                        <a:latin typeface="배스킨라빈스 R" panose="02020603020101020101" pitchFamily="18" charset="-127"/>
-                        <a:ea typeface="배스킨라빈스 R" panose="02020603020101020101" pitchFamily="18" charset="-127"/>
-                      </a:endParaRPr>
-                    </a:p>
-                  </a:txBody>
-                  <a:tcPr anchor="ctr"/>
-                </a:tc>
-                <a:extLst>
-                  <a:ext uri="{0D108BD9-81ED-4DB2-BD59-A6C34878D82A}">
-                    <a16:rowId xmlns:a16="http://schemas.microsoft.com/office/drawing/2014/main" val="849694611"/>
-                  </a:ext>
-                </a:extLst>
-              </a:tr>
-              <a:tr h="320040">
-                <a:tc>
-                  <a:txBody>
-                    <a:bodyPr/>
-                    <a:lstStyle/>
-                    <a:p>
-                      <a:pPr latinLnBrk="1"/>
-                      <a:r>
-                        <a:rPr lang="ko-KR" altLang="en-US" dirty="0">
-                          <a:solidFill>
-                            <a:schemeClr val="accent5">
-                              <a:lumMod val="20000"/>
-                              <a:lumOff val="80000"/>
-                            </a:schemeClr>
-                          </a:solidFill>
-                          <a:latin typeface="배스킨라빈스 R" panose="02020603020101020101" pitchFamily="18" charset="-127"/>
-                          <a:ea typeface="배스킨라빈스 R" panose="02020603020101020101" pitchFamily="18" charset="-127"/>
-                        </a:rPr>
-                        <a:t>델타 시간</a:t>
-                      </a:r>
-                    </a:p>
-                  </a:txBody>
-                  <a:tcPr anchor="ctr"/>
-                </a:tc>
-                <a:tc>
-                  <a:txBody>
-                    <a:bodyPr/>
-                    <a:lstStyle/>
-                    <a:p>
-                      <a:pPr latinLnBrk="1"/>
-                      <a:r>
-                        <a:rPr lang="ko-KR" altLang="en-US" dirty="0">
-                          <a:solidFill>
-                            <a:schemeClr val="accent6">
-                              <a:lumMod val="20000"/>
-                              <a:lumOff val="80000"/>
-                            </a:schemeClr>
-                          </a:solidFill>
-                          <a:latin typeface="배스킨라빈스 R" panose="02020603020101020101" pitchFamily="18" charset="-127"/>
-                          <a:ea typeface="배스킨라빈스 R" panose="02020603020101020101" pitchFamily="18" charset="-127"/>
-                        </a:rPr>
-                        <a:t>화면 프레임 기반 </a:t>
-                      </a:r>
-                      <a:r>
-                        <a:rPr lang="en-US" altLang="ko-KR" dirty="0">
-                          <a:solidFill>
-                            <a:schemeClr val="accent6">
-                              <a:lumMod val="20000"/>
-                              <a:lumOff val="80000"/>
-                            </a:schemeClr>
-                          </a:solidFill>
-                          <a:latin typeface="배스킨라빈스 R" panose="02020603020101020101" pitchFamily="18" charset="-127"/>
-                          <a:ea typeface="배스킨라빈스 R" panose="02020603020101020101" pitchFamily="18" charset="-127"/>
-                        </a:rPr>
-                        <a:t>delta</a:t>
-                      </a:r>
-                      <a:endParaRPr lang="ko-KR" altLang="en-US" dirty="0">
-                        <a:solidFill>
-                          <a:schemeClr val="accent6">
-                            <a:lumMod val="20000"/>
-                            <a:lumOff val="80000"/>
-                          </a:schemeClr>
-                        </a:solidFill>
-                        <a:latin typeface="배스킨라빈스 R" panose="02020603020101020101" pitchFamily="18" charset="-127"/>
-                        <a:ea typeface="배스킨라빈스 R" panose="02020603020101020101" pitchFamily="18" charset="-127"/>
-                      </a:endParaRPr>
-                    </a:p>
-                  </a:txBody>
-                  <a:tcPr anchor="ctr"/>
-                </a:tc>
-                <a:tc>
-                  <a:txBody>
-                    <a:bodyPr/>
-                    <a:lstStyle/>
-                    <a:p>
-                      <a:pPr latinLnBrk="1"/>
-                      <a:r>
-                        <a:rPr lang="ko-KR" altLang="en-US" dirty="0">
-                          <a:solidFill>
-                            <a:schemeClr val="accent6">
-                              <a:lumMod val="20000"/>
-                              <a:lumOff val="80000"/>
-                            </a:schemeClr>
-                          </a:solidFill>
-                          <a:latin typeface="배스킨라빈스 R" panose="02020603020101020101" pitchFamily="18" charset="-127"/>
-                          <a:ea typeface="배스킨라빈스 R" panose="02020603020101020101" pitchFamily="18" charset="-127"/>
-                        </a:rPr>
-                        <a:t>물리 프레임 기반 </a:t>
-                      </a:r>
-                      <a:r>
-                        <a:rPr lang="en-US" altLang="ko-KR" dirty="0">
-                          <a:solidFill>
-                            <a:schemeClr val="accent6">
-                              <a:lumMod val="20000"/>
-                              <a:lumOff val="80000"/>
-                            </a:schemeClr>
-                          </a:solidFill>
-                          <a:latin typeface="배스킨라빈스 R" panose="02020603020101020101" pitchFamily="18" charset="-127"/>
-                          <a:ea typeface="배스킨라빈스 R" panose="02020603020101020101" pitchFamily="18" charset="-127"/>
-                        </a:rPr>
-                        <a:t>delta</a:t>
-                      </a:r>
-                      <a:endParaRPr lang="ko-KR" altLang="en-US" dirty="0">
-                        <a:solidFill>
-                          <a:schemeClr val="accent6">
-                            <a:lumMod val="20000"/>
-                            <a:lumOff val="80000"/>
-                          </a:schemeClr>
-                        </a:solidFill>
-                        <a:latin typeface="배스킨라빈스 R" panose="02020603020101020101" pitchFamily="18" charset="-127"/>
-                        <a:ea typeface="배스킨라빈스 R" panose="02020603020101020101" pitchFamily="18" charset="-127"/>
-                      </a:endParaRPr>
-                    </a:p>
-                  </a:txBody>
-                  <a:tcPr anchor="ctr"/>
-                </a:tc>
-                <a:extLst>
-                  <a:ext uri="{0D108BD9-81ED-4DB2-BD59-A6C34878D82A}">
-                    <a16:rowId xmlns:a16="http://schemas.microsoft.com/office/drawing/2014/main" val="3974298399"/>
-                  </a:ext>
-                </a:extLst>
-              </a:tr>
-              <a:tr h="320040">
-                <a:tc>
-                  <a:txBody>
-                    <a:bodyPr/>
-                    <a:lstStyle/>
-                    <a:p>
-                      <a:pPr latinLnBrk="1"/>
-                      <a:r>
-                        <a:rPr lang="ko-KR" altLang="en-US" dirty="0">
-                          <a:solidFill>
-                            <a:schemeClr val="accent5">
-                              <a:lumMod val="20000"/>
-                              <a:lumOff val="80000"/>
-                            </a:schemeClr>
-                          </a:solidFill>
-                          <a:latin typeface="배스킨라빈스 R" panose="02020603020101020101" pitchFamily="18" charset="-127"/>
-                          <a:ea typeface="배스킨라빈스 R" panose="02020603020101020101" pitchFamily="18" charset="-127"/>
-                        </a:rPr>
-                        <a:t>타이밍 일관성</a:t>
-                      </a:r>
-                    </a:p>
-                  </a:txBody>
-                  <a:tcPr anchor="ctr"/>
-                </a:tc>
-                <a:tc>
-                  <a:txBody>
-                    <a:bodyPr/>
-                    <a:lstStyle/>
-                    <a:p>
-                      <a:pPr latinLnBrk="1"/>
-                      <a:r>
-                        <a:rPr lang="ko-KR" altLang="en-US" dirty="0">
-                          <a:solidFill>
-                            <a:schemeClr val="accent6">
-                              <a:lumMod val="20000"/>
-                              <a:lumOff val="80000"/>
-                            </a:schemeClr>
-                          </a:solidFill>
-                          <a:latin typeface="배스킨라빈스 R" panose="02020603020101020101" pitchFamily="18" charset="-127"/>
-                          <a:ea typeface="배스킨라빈스 R" panose="02020603020101020101" pitchFamily="18" charset="-127"/>
-                        </a:rPr>
-                        <a:t>하드웨어 성능 따라 달라짐</a:t>
-                      </a:r>
-                    </a:p>
-                  </a:txBody>
-                  <a:tcPr anchor="ctr"/>
-                </a:tc>
-                <a:tc>
-                  <a:txBody>
-                    <a:bodyPr/>
-                    <a:lstStyle/>
-                    <a:p>
-                      <a:pPr latinLnBrk="1"/>
-                      <a:r>
-                        <a:rPr lang="ko-KR" altLang="en-US" dirty="0">
-                          <a:solidFill>
-                            <a:schemeClr val="accent6">
-                              <a:lumMod val="20000"/>
-                              <a:lumOff val="80000"/>
-                            </a:schemeClr>
-                          </a:solidFill>
-                          <a:latin typeface="배스킨라빈스 R" panose="02020603020101020101" pitchFamily="18" charset="-127"/>
-                          <a:ea typeface="배스킨라빈스 R" panose="02020603020101020101" pitchFamily="18" charset="-127"/>
-                        </a:rPr>
-                        <a:t>일정한 시간 간격 유지</a:t>
-                      </a:r>
-                    </a:p>
-                  </a:txBody>
-                  <a:tcPr anchor="ctr"/>
-                </a:tc>
-                <a:extLst>
-                  <a:ext uri="{0D108BD9-81ED-4DB2-BD59-A6C34878D82A}">
-                    <a16:rowId xmlns:a16="http://schemas.microsoft.com/office/drawing/2014/main" val="2631784345"/>
-                  </a:ext>
-                </a:extLst>
-              </a:tr>
-            </a:tbl>
-          </a:graphicData>
-        </a:graphic>
-      </p:graphicFrame>
-    </p:spTree>
-    <p:extLst>
-      <p:ext uri="{BB962C8B-B14F-4D97-AF65-F5344CB8AC3E}">
-        <p14:creationId xmlns:p14="http://schemas.microsoft.com/office/powerpoint/2010/main" val="1004202230"/>
-      </p:ext>
-    </p:extLst>
-  </p:cSld>
-  <p:clrMapOvr>
-    <a:masterClrMapping/>
-  </p:clrMapOvr>
-</p:sld>
-</file>
-
-<file path=ppt/slides/slide4.xml><?xml version="1.0" encoding="utf-8"?>
-<p:sld xmlns:a="http://schemas.openxmlformats.org/drawingml/2006/main" xmlns:r="http://schemas.openxmlformats.org/officeDocument/2006/relationships" xmlns:p="http://schemas.openxmlformats.org/presentationml/2006/main">
-  <p:cSld>
-    <p:spTree>
-      <p:nvGrpSpPr>
-        <p:cNvPr id="1" name=""/>
-        <p:cNvGrpSpPr/>
-        <p:nvPr/>
-      </p:nvGrpSpPr>
-      <p:grpSpPr>
-        <a:xfrm>
-          <a:off x="0" y="0"/>
-          <a:ext cx="0" cy="0"/>
-          <a:chOff x="0" y="0"/>
-          <a:chExt cx="0" cy="0"/>
-        </a:xfrm>
-      </p:grpSpPr>
-      <p:sp>
-        <p:nvSpPr>
-          <p:cNvPr id="15" name="직사각형 14">
-            <a:extLst>
-              <a:ext uri="{FF2B5EF4-FFF2-40B4-BE49-F238E27FC236}">
-                <a16:creationId xmlns:a16="http://schemas.microsoft.com/office/drawing/2014/main" id="{AC8DA9A0-646D-4BBC-865C-5347AEDE318F}"/>
-              </a:ext>
-            </a:extLst>
-          </p:cNvPr>
-          <p:cNvSpPr/>
-          <p:nvPr/>
-        </p:nvSpPr>
-        <p:spPr>
-          <a:xfrm>
-            <a:off x="0" y="0"/>
-            <a:ext cx="12192000" cy="6858000"/>
-          </a:xfrm>
-          <a:prstGeom prst="rect">
-            <a:avLst/>
-          </a:prstGeom>
-          <a:solidFill>
-            <a:srgbClr val="414042"/>
-          </a:solidFill>
-          <a:ln>
-            <a:noFill/>
-          </a:ln>
-        </p:spPr>
-        <p:style>
-          <a:lnRef idx="2">
-            <a:schemeClr val="accent1">
-              <a:shade val="50000"/>
-            </a:schemeClr>
-          </a:lnRef>
-          <a:fillRef idx="1">
-            <a:schemeClr val="accent1"/>
-          </a:fillRef>
-          <a:effectRef idx="0">
-            <a:schemeClr val="accent1"/>
-          </a:effectRef>
-          <a:fontRef idx="minor">
-            <a:schemeClr val="lt1"/>
-          </a:fontRef>
-        </p:style>
-        <p:txBody>
-          <a:bodyPr rtlCol="0" anchor="ctr"/>
-          <a:lstStyle/>
-          <a:p>
-            <a:pPr algn="ctr"/>
-            <a:endParaRPr lang="ko-KR" altLang="en-US" dirty="0">
-              <a:solidFill>
-                <a:schemeClr val="accent4">
-                  <a:lumMod val="60000"/>
-                  <a:lumOff val="40000"/>
-                </a:schemeClr>
-              </a:solidFill>
-            </a:endParaRPr>
-          </a:p>
-        </p:txBody>
-      </p:sp>
-      <p:sp>
-        <p:nvSpPr>
-          <p:cNvPr id="2" name="TextBox 1">
-            <a:extLst>
-              <a:ext uri="{FF2B5EF4-FFF2-40B4-BE49-F238E27FC236}">
-                <a16:creationId xmlns:a16="http://schemas.microsoft.com/office/drawing/2014/main" id="{2B6A17E4-2DDB-4B93-9576-1F677FD33C74}"/>
-              </a:ext>
-            </a:extLst>
-          </p:cNvPr>
-          <p:cNvSpPr txBox="1"/>
-          <p:nvPr/>
-        </p:nvSpPr>
-        <p:spPr>
-          <a:xfrm>
-            <a:off x="1573945" y="397823"/>
-            <a:ext cx="9044143" cy="707886"/>
-          </a:xfrm>
-          <a:prstGeom prst="rect">
-            <a:avLst/>
-          </a:prstGeom>
-          <a:noFill/>
-        </p:spPr>
-        <p:txBody>
-          <a:bodyPr wrap="none" rtlCol="0">
-            <a:spAutoFit/>
-          </a:bodyPr>
-          <a:lstStyle/>
-          <a:p>
-            <a:pPr algn="ctr"/>
-            <a:r>
-              <a:rPr lang="en-US" altLang="ko-KR" sz="4000" dirty="0">
-                <a:solidFill>
-                  <a:schemeClr val="accent2">
-                    <a:lumMod val="60000"/>
-                    <a:lumOff val="40000"/>
-                  </a:schemeClr>
-                </a:solidFill>
-                <a:latin typeface="태나다체 " panose="02000000000000000000" pitchFamily="2" charset="-127"/>
-                <a:ea typeface="태나다체 " panose="02000000000000000000" pitchFamily="2" charset="-127"/>
-              </a:rPr>
-              <a:t>_process()</a:t>
-            </a:r>
-            <a:r>
-              <a:rPr lang="ko-KR" altLang="en-US" sz="4000" dirty="0">
-                <a:solidFill>
-                  <a:schemeClr val="accent2">
-                    <a:lumMod val="60000"/>
-                    <a:lumOff val="40000"/>
-                  </a:schemeClr>
-                </a:solidFill>
-                <a:latin typeface="태나다체 " panose="02000000000000000000" pitchFamily="2" charset="-127"/>
-                <a:ea typeface="태나다체 " panose="02000000000000000000" pitchFamily="2" charset="-127"/>
-              </a:rPr>
-              <a:t> </a:t>
-            </a:r>
-            <a:r>
-              <a:rPr lang="en-US" altLang="ko-KR" sz="4000" dirty="0">
-                <a:solidFill>
-                  <a:schemeClr val="bg1"/>
-                </a:solidFill>
-                <a:latin typeface="태나다체 " panose="02000000000000000000" pitchFamily="2" charset="-127"/>
-                <a:ea typeface="태나다체 " panose="02000000000000000000" pitchFamily="2" charset="-127"/>
-              </a:rPr>
-              <a:t>vs.</a:t>
-            </a:r>
-            <a:r>
-              <a:rPr lang="ko-KR" altLang="en-US" sz="4000" dirty="0">
-                <a:solidFill>
-                  <a:schemeClr val="accent2">
-                    <a:lumMod val="60000"/>
-                    <a:lumOff val="40000"/>
-                  </a:schemeClr>
-                </a:solidFill>
-                <a:latin typeface="태나다체 " panose="02000000000000000000" pitchFamily="2" charset="-127"/>
-                <a:ea typeface="태나다체 " panose="02000000000000000000" pitchFamily="2" charset="-127"/>
-              </a:rPr>
-              <a:t> </a:t>
-            </a:r>
-            <a:r>
-              <a:rPr lang="en-US" altLang="ko-KR" sz="4000" dirty="0">
-                <a:solidFill>
-                  <a:schemeClr val="accent2">
-                    <a:lumMod val="60000"/>
-                    <a:lumOff val="40000"/>
-                  </a:schemeClr>
-                </a:solidFill>
-                <a:latin typeface="태나다체 " panose="02000000000000000000" pitchFamily="2" charset="-127"/>
-                <a:ea typeface="태나다체 " panose="02000000000000000000" pitchFamily="2" charset="-127"/>
-              </a:rPr>
-              <a:t>_</a:t>
-            </a:r>
-            <a:r>
-              <a:rPr lang="en-US" altLang="ko-KR" sz="4000" dirty="0" err="1">
-                <a:solidFill>
-                  <a:schemeClr val="accent2">
-                    <a:lumMod val="60000"/>
-                    <a:lumOff val="40000"/>
-                  </a:schemeClr>
-                </a:solidFill>
-                <a:latin typeface="태나다체 " panose="02000000000000000000" pitchFamily="2" charset="-127"/>
-                <a:ea typeface="태나다체 " panose="02000000000000000000" pitchFamily="2" charset="-127"/>
-              </a:rPr>
-              <a:t>physics_process</a:t>
-            </a:r>
-            <a:r>
-              <a:rPr lang="en-US" altLang="ko-KR" sz="4000" dirty="0">
-                <a:solidFill>
-                  <a:schemeClr val="accent2">
-                    <a:lumMod val="60000"/>
-                    <a:lumOff val="40000"/>
-                  </a:schemeClr>
-                </a:solidFill>
-                <a:latin typeface="태나다체 " panose="02000000000000000000" pitchFamily="2" charset="-127"/>
-                <a:ea typeface="태나다체 " panose="02000000000000000000" pitchFamily="2" charset="-127"/>
-              </a:rPr>
-              <a:t>()</a:t>
-            </a:r>
-            <a:endParaRPr lang="ko-KR" altLang="en-US" sz="4000" dirty="0">
-              <a:solidFill>
-                <a:schemeClr val="bg1"/>
-              </a:solidFill>
-              <a:latin typeface="태나다체 " panose="02000000000000000000" pitchFamily="2" charset="-127"/>
-              <a:ea typeface="태나다체 " panose="02000000000000000000" pitchFamily="2" charset="-127"/>
-            </a:endParaRPr>
-          </a:p>
-        </p:txBody>
-      </p:sp>
-      <p:pic>
-        <p:nvPicPr>
-          <p:cNvPr id="14" name="그림 13">
-            <a:extLst>
-              <a:ext uri="{FF2B5EF4-FFF2-40B4-BE49-F238E27FC236}">
-                <a16:creationId xmlns:a16="http://schemas.microsoft.com/office/drawing/2014/main" id="{057A1348-A3CE-4DA5-9D84-5DB18862A61E}"/>
-              </a:ext>
-            </a:extLst>
-          </p:cNvPr>
-          <p:cNvPicPr>
-            <a:picLocks noChangeAspect="1"/>
-          </p:cNvPicPr>
-          <p:nvPr/>
-        </p:nvPicPr>
-        <p:blipFill>
-          <a:blip r:embed="rId2">
-            <a:extLst>
-              <a:ext uri="{28A0092B-C50C-407E-A947-70E740481C1C}">
-                <a14:useLocalDpi xmlns:a14="http://schemas.microsoft.com/office/drawing/2010/main" val="0"/>
-              </a:ext>
-            </a:extLst>
-          </a:blip>
-          <a:stretch>
-            <a:fillRect/>
-          </a:stretch>
-        </p:blipFill>
-        <p:spPr>
-          <a:xfrm rot="1835132">
-            <a:off x="-1679702" y="-1168087"/>
-            <a:ext cx="2741223" cy="2741223"/>
-          </a:xfrm>
-          <a:prstGeom prst="rect">
-            <a:avLst/>
-          </a:prstGeom>
-        </p:spPr>
-      </p:pic>
-      <p:pic>
-        <p:nvPicPr>
-          <p:cNvPr id="13" name="그림 12">
-            <a:extLst>
-              <a:ext uri="{FF2B5EF4-FFF2-40B4-BE49-F238E27FC236}">
-                <a16:creationId xmlns:a16="http://schemas.microsoft.com/office/drawing/2014/main" id="{4D86BD98-BEF1-4770-8C54-2A0C065ABC5B}"/>
-              </a:ext>
-            </a:extLst>
-          </p:cNvPr>
-          <p:cNvPicPr>
-            <a:picLocks noChangeAspect="1"/>
-          </p:cNvPicPr>
-          <p:nvPr/>
-        </p:nvPicPr>
-        <p:blipFill>
-          <a:blip r:embed="rId2">
-            <a:extLst>
-              <a:ext uri="{28A0092B-C50C-407E-A947-70E740481C1C}">
-                <a14:useLocalDpi xmlns:a14="http://schemas.microsoft.com/office/drawing/2010/main" val="0"/>
-              </a:ext>
-            </a:extLst>
-          </a:blip>
-          <a:stretch>
-            <a:fillRect/>
-          </a:stretch>
-        </p:blipFill>
-        <p:spPr>
-          <a:xfrm rot="1835132">
-            <a:off x="10618517" y="4947062"/>
-            <a:ext cx="2741223" cy="2741223"/>
-          </a:xfrm>
-          <a:prstGeom prst="rect">
-            <a:avLst/>
-          </a:prstGeom>
-        </p:spPr>
-      </p:pic>
-      <p:sp>
-        <p:nvSpPr>
-          <p:cNvPr id="19" name="TextBox 18">
-            <a:extLst>
-              <a:ext uri="{FF2B5EF4-FFF2-40B4-BE49-F238E27FC236}">
-                <a16:creationId xmlns:a16="http://schemas.microsoft.com/office/drawing/2014/main" id="{284E68B5-0BC1-464B-9E55-5ED284760A63}"/>
-              </a:ext>
-            </a:extLst>
-          </p:cNvPr>
-          <p:cNvSpPr txBox="1"/>
-          <p:nvPr/>
-        </p:nvSpPr>
-        <p:spPr>
-          <a:xfrm>
-            <a:off x="1568230" y="2079844"/>
-            <a:ext cx="2904962" cy="584775"/>
-          </a:xfrm>
-          <a:prstGeom prst="rect">
-            <a:avLst/>
-          </a:prstGeom>
-          <a:noFill/>
-        </p:spPr>
-        <p:txBody>
-          <a:bodyPr wrap="none" rtlCol="0">
-            <a:spAutoFit/>
-          </a:bodyPr>
-          <a:lstStyle/>
-          <a:p>
-            <a:r>
-              <a:rPr lang="ko-KR" altLang="en-US" sz="3200" dirty="0">
-                <a:solidFill>
-                  <a:schemeClr val="accent4">
-                    <a:lumMod val="60000"/>
-                    <a:lumOff val="40000"/>
-                  </a:schemeClr>
-                </a:solidFill>
-                <a:latin typeface="배스킨라빈스 R" panose="02020603020101020101" pitchFamily="18" charset="-127"/>
-                <a:ea typeface="배스킨라빈스 R" panose="02020603020101020101" pitchFamily="18" charset="-127"/>
-              </a:rPr>
-              <a:t>각 메서드 장단점</a:t>
-            </a:r>
-          </a:p>
-        </p:txBody>
-      </p:sp>
-      <p:graphicFrame>
-        <p:nvGraphicFramePr>
-          <p:cNvPr id="20" name="표 4">
-            <a:extLst>
-              <a:ext uri="{FF2B5EF4-FFF2-40B4-BE49-F238E27FC236}">
-                <a16:creationId xmlns:a16="http://schemas.microsoft.com/office/drawing/2014/main" id="{0846C89D-2EF1-4BCC-9E24-FF87EC738A75}"/>
-              </a:ext>
-            </a:extLst>
-          </p:cNvPr>
-          <p:cNvGraphicFramePr>
-            <a:graphicFrameLocks noGrp="1"/>
-          </p:cNvGraphicFramePr>
-          <p:nvPr>
-            <p:extLst>
-              <p:ext uri="{D42A27DB-BD31-4B8C-83A1-F6EECF244321}">
-                <p14:modId xmlns:p14="http://schemas.microsoft.com/office/powerpoint/2010/main" val="3098807451"/>
-              </p:ext>
-            </p:extLst>
-          </p:nvPr>
-        </p:nvGraphicFramePr>
-        <p:xfrm>
-          <a:off x="1568230" y="2664619"/>
-          <a:ext cx="9049858" cy="1381760"/>
-        </p:xfrm>
-        <a:graphic>
-          <a:graphicData uri="http://schemas.openxmlformats.org/drawingml/2006/table">
-            <a:tbl>
-              <a:tblPr firstRow="1" bandRow="1">
-                <a:tableStyleId>{C083E6E3-FA7D-4D7B-A595-EF9225AFEA82}</a:tableStyleId>
-              </a:tblPr>
-              <a:tblGrid>
-                <a:gridCol w="1616745">
-                  <a:extLst>
-                    <a:ext uri="{9D8B030D-6E8A-4147-A177-3AD203B41FA5}">
-                      <a16:colId xmlns:a16="http://schemas.microsoft.com/office/drawing/2014/main" val="3183162679"/>
-                    </a:ext>
-                  </a:extLst>
-                </a:gridCol>
-                <a:gridCol w="3541502">
-                  <a:extLst>
-                    <a:ext uri="{9D8B030D-6E8A-4147-A177-3AD203B41FA5}">
-                      <a16:colId xmlns:a16="http://schemas.microsoft.com/office/drawing/2014/main" val="3015536629"/>
-                    </a:ext>
-                  </a:extLst>
-                </a:gridCol>
-                <a:gridCol w="3891611">
-                  <a:extLst>
-                    <a:ext uri="{9D8B030D-6E8A-4147-A177-3AD203B41FA5}">
-                      <a16:colId xmlns:a16="http://schemas.microsoft.com/office/drawing/2014/main" val="4266326658"/>
-                    </a:ext>
-                  </a:extLst>
-                </a:gridCol>
-              </a:tblGrid>
-              <a:tr h="370840">
-                <a:tc>
-                  <a:txBody>
-                    <a:bodyPr/>
-                    <a:lstStyle/>
-                    <a:p>
-                      <a:pPr latinLnBrk="1"/>
-                      <a:r>
-                        <a:rPr lang="ko-KR" altLang="en-US" dirty="0">
-                          <a:solidFill>
-                            <a:schemeClr val="accent5">
-                              <a:lumMod val="60000"/>
-                              <a:lumOff val="40000"/>
-                            </a:schemeClr>
-                          </a:solidFill>
-                          <a:latin typeface="배스킨라빈스 R" panose="02020603020101020101" pitchFamily="18" charset="-127"/>
-                          <a:ea typeface="배스킨라빈스 R" panose="02020603020101020101" pitchFamily="18" charset="-127"/>
-                        </a:rPr>
-                        <a:t>항목</a:t>
-                      </a:r>
-                    </a:p>
-                  </a:txBody>
-                  <a:tcPr anchor="ctr"/>
-                </a:tc>
-                <a:tc>
-                  <a:txBody>
-                    <a:bodyPr/>
-                    <a:lstStyle/>
-                    <a:p>
-                      <a:pPr latinLnBrk="1"/>
-                      <a:r>
-                        <a:rPr lang="en-US" altLang="ko-KR" dirty="0">
-                          <a:solidFill>
-                            <a:schemeClr val="accent6">
-                              <a:lumMod val="60000"/>
-                              <a:lumOff val="40000"/>
-                            </a:schemeClr>
-                          </a:solidFill>
-                          <a:latin typeface="배스킨라빈스 R" panose="02020603020101020101" pitchFamily="18" charset="-127"/>
-                          <a:ea typeface="배스킨라빈스 R" panose="02020603020101020101" pitchFamily="18" charset="-127"/>
-                        </a:rPr>
-                        <a:t>_process(delta)</a:t>
-                      </a:r>
-                      <a:endParaRPr lang="ko-KR" altLang="en-US" dirty="0">
-                        <a:solidFill>
-                          <a:schemeClr val="accent6">
-                            <a:lumMod val="60000"/>
-                            <a:lumOff val="40000"/>
-                          </a:schemeClr>
-                        </a:solidFill>
-                        <a:latin typeface="배스킨라빈스 R" panose="02020603020101020101" pitchFamily="18" charset="-127"/>
-                        <a:ea typeface="배스킨라빈스 R" panose="02020603020101020101" pitchFamily="18" charset="-127"/>
-                      </a:endParaRPr>
-                    </a:p>
-                  </a:txBody>
-                  <a:tcPr anchor="ctr"/>
-                </a:tc>
-                <a:tc>
-                  <a:txBody>
-                    <a:bodyPr/>
-                    <a:lstStyle/>
-                    <a:p>
-                      <a:pPr latinLnBrk="1"/>
-                      <a:r>
-                        <a:rPr lang="en-US" altLang="ko-KR" dirty="0">
-                          <a:solidFill>
-                            <a:schemeClr val="accent6">
-                              <a:lumMod val="60000"/>
-                              <a:lumOff val="40000"/>
-                            </a:schemeClr>
-                          </a:solidFill>
-                          <a:latin typeface="배스킨라빈스 R" panose="02020603020101020101" pitchFamily="18" charset="-127"/>
-                          <a:ea typeface="배스킨라빈스 R" panose="02020603020101020101" pitchFamily="18" charset="-127"/>
-                        </a:rPr>
-                        <a:t>_</a:t>
-                      </a:r>
-                      <a:r>
-                        <a:rPr lang="en-US" altLang="ko-KR" dirty="0" err="1">
-                          <a:solidFill>
-                            <a:schemeClr val="accent6">
-                              <a:lumMod val="60000"/>
-                              <a:lumOff val="40000"/>
-                            </a:schemeClr>
-                          </a:solidFill>
-                          <a:latin typeface="배스킨라빈스 R" panose="02020603020101020101" pitchFamily="18" charset="-127"/>
-                          <a:ea typeface="배스킨라빈스 R" panose="02020603020101020101" pitchFamily="18" charset="-127"/>
-                        </a:rPr>
-                        <a:t>physics_process</a:t>
-                      </a:r>
-                      <a:r>
-                        <a:rPr lang="en-US" altLang="ko-KR" dirty="0">
-                          <a:solidFill>
-                            <a:schemeClr val="accent6">
-                              <a:lumMod val="60000"/>
-                              <a:lumOff val="40000"/>
-                            </a:schemeClr>
-                          </a:solidFill>
-                          <a:latin typeface="배스킨라빈스 R" panose="02020603020101020101" pitchFamily="18" charset="-127"/>
-                          <a:ea typeface="배스킨라빈스 R" panose="02020603020101020101" pitchFamily="18" charset="-127"/>
-                        </a:rPr>
-                        <a:t>(delta)</a:t>
-                      </a:r>
-                      <a:endParaRPr lang="ko-KR" altLang="en-US" dirty="0">
-                        <a:solidFill>
-                          <a:schemeClr val="accent6">
-                            <a:lumMod val="60000"/>
-                            <a:lumOff val="40000"/>
-                          </a:schemeClr>
-                        </a:solidFill>
-                        <a:latin typeface="배스킨라빈스 R" panose="02020603020101020101" pitchFamily="18" charset="-127"/>
-                        <a:ea typeface="배스킨라빈스 R" panose="02020603020101020101" pitchFamily="18" charset="-127"/>
-                      </a:endParaRPr>
-                    </a:p>
-                  </a:txBody>
-                  <a:tcPr anchor="ctr"/>
-                </a:tc>
-                <a:extLst>
-                  <a:ext uri="{0D108BD9-81ED-4DB2-BD59-A6C34878D82A}">
-                    <a16:rowId xmlns:a16="http://schemas.microsoft.com/office/drawing/2014/main" val="1431255208"/>
-                  </a:ext>
-                </a:extLst>
-              </a:tr>
-              <a:tr h="370840">
-                <a:tc>
-                  <a:txBody>
-                    <a:bodyPr/>
-                    <a:lstStyle/>
-                    <a:p>
-                      <a:pPr latinLnBrk="1"/>
-                      <a:r>
-                        <a:rPr lang="ko-KR" altLang="en-US" dirty="0">
-                          <a:solidFill>
-                            <a:schemeClr val="accent5">
-                              <a:lumMod val="20000"/>
-                              <a:lumOff val="80000"/>
-                            </a:schemeClr>
-                          </a:solidFill>
-                          <a:latin typeface="배스킨라빈스 R" panose="02020603020101020101" pitchFamily="18" charset="-127"/>
-                          <a:ea typeface="배스킨라빈스 R" panose="02020603020101020101" pitchFamily="18" charset="-127"/>
-                        </a:rPr>
-                        <a:t>장점</a:t>
-                      </a:r>
-                    </a:p>
-                  </a:txBody>
-                  <a:tcPr anchor="ctr"/>
-                </a:tc>
-                <a:tc>
-                  <a:txBody>
-                    <a:bodyPr/>
-                    <a:lstStyle/>
-                    <a:p>
-                      <a:pPr marL="285750" indent="-285750" latinLnBrk="1">
-                        <a:buFontTx/>
-                        <a:buChar char="-"/>
-                      </a:pPr>
-                      <a:r>
-                        <a:rPr lang="ko-KR" altLang="en-US" dirty="0">
-                          <a:solidFill>
-                            <a:schemeClr val="accent6">
-                              <a:lumMod val="20000"/>
-                              <a:lumOff val="80000"/>
-                            </a:schemeClr>
-                          </a:solidFill>
-                          <a:latin typeface="배스킨라빈스 R" panose="02020603020101020101" pitchFamily="18" charset="-127"/>
-                          <a:ea typeface="배스킨라빈스 R" panose="02020603020101020101" pitchFamily="18" charset="-127"/>
-                        </a:rPr>
-                        <a:t>빠른 </a:t>
-                      </a:r>
-                      <a:r>
-                        <a:rPr lang="en-US" altLang="ko-KR" dirty="0">
-                          <a:solidFill>
-                            <a:schemeClr val="accent6">
-                              <a:lumMod val="20000"/>
-                              <a:lumOff val="80000"/>
-                            </a:schemeClr>
-                          </a:solidFill>
-                          <a:latin typeface="배스킨라빈스 R" panose="02020603020101020101" pitchFamily="18" charset="-127"/>
-                          <a:ea typeface="배스킨라빈스 R" panose="02020603020101020101" pitchFamily="18" charset="-127"/>
-                        </a:rPr>
-                        <a:t>UI </a:t>
-                      </a:r>
-                      <a:r>
-                        <a:rPr lang="ko-KR" altLang="en-US" dirty="0">
-                          <a:solidFill>
-                            <a:schemeClr val="accent6">
-                              <a:lumMod val="20000"/>
-                              <a:lumOff val="80000"/>
-                            </a:schemeClr>
-                          </a:solidFill>
-                          <a:latin typeface="배스킨라빈스 R" panose="02020603020101020101" pitchFamily="18" charset="-127"/>
-                          <a:ea typeface="배스킨라빈스 R" panose="02020603020101020101" pitchFamily="18" charset="-127"/>
-                        </a:rPr>
-                        <a:t>반응 처리</a:t>
-                      </a:r>
-                      <a:endParaRPr lang="en-US" altLang="ko-KR" dirty="0">
-                        <a:solidFill>
-                          <a:schemeClr val="accent6">
-                            <a:lumMod val="20000"/>
-                            <a:lumOff val="80000"/>
-                          </a:schemeClr>
-                        </a:solidFill>
-                        <a:latin typeface="배스킨라빈스 R" panose="02020603020101020101" pitchFamily="18" charset="-127"/>
-                        <a:ea typeface="배스킨라빈스 R" panose="02020603020101020101" pitchFamily="18" charset="-127"/>
-                      </a:endParaRPr>
-                    </a:p>
-                    <a:p>
-                      <a:pPr marL="285750" indent="-285750" latinLnBrk="1">
-                        <a:buFontTx/>
-                        <a:buChar char="-"/>
-                      </a:pPr>
-                      <a:r>
-                        <a:rPr lang="ko-KR" altLang="en-US" dirty="0">
-                          <a:solidFill>
-                            <a:schemeClr val="accent6">
-                              <a:lumMod val="20000"/>
-                              <a:lumOff val="80000"/>
-                            </a:schemeClr>
-                          </a:solidFill>
-                          <a:latin typeface="배스킨라빈스 R" panose="02020603020101020101" pitchFamily="18" charset="-127"/>
-                          <a:ea typeface="배스킨라빈스 R" panose="02020603020101020101" pitchFamily="18" charset="-127"/>
-                        </a:rPr>
-                        <a:t>부드러운 시각 효과</a:t>
-                      </a:r>
-                    </a:p>
-                  </a:txBody>
-                  <a:tcPr anchor="ctr"/>
-                </a:tc>
-                <a:tc>
-                  <a:txBody>
-                    <a:bodyPr/>
-                    <a:lstStyle/>
-                    <a:p>
-                      <a:pPr marL="285750" indent="-285750" latinLnBrk="1">
-                        <a:buFontTx/>
-                        <a:buChar char="-"/>
-                      </a:pPr>
-                      <a:r>
-                        <a:rPr lang="ko-KR" altLang="en-US" dirty="0">
-                          <a:solidFill>
-                            <a:schemeClr val="accent6">
-                              <a:lumMod val="20000"/>
-                              <a:lumOff val="80000"/>
-                            </a:schemeClr>
-                          </a:solidFill>
-                          <a:latin typeface="배스킨라빈스 R" panose="02020603020101020101" pitchFamily="18" charset="-127"/>
-                          <a:ea typeface="배스킨라빈스 R" panose="02020603020101020101" pitchFamily="18" charset="-127"/>
-                        </a:rPr>
-                        <a:t>물리적 안정성 보장</a:t>
-                      </a:r>
-                      <a:endParaRPr lang="en-US" altLang="ko-KR" dirty="0">
-                        <a:solidFill>
-                          <a:schemeClr val="accent6">
-                            <a:lumMod val="20000"/>
-                            <a:lumOff val="80000"/>
-                          </a:schemeClr>
-                        </a:solidFill>
-                        <a:latin typeface="배스킨라빈스 R" panose="02020603020101020101" pitchFamily="18" charset="-127"/>
-                        <a:ea typeface="배스킨라빈스 R" panose="02020603020101020101" pitchFamily="18" charset="-127"/>
-                      </a:endParaRPr>
-                    </a:p>
-                    <a:p>
-                      <a:pPr marL="285750" indent="-285750" latinLnBrk="1">
-                        <a:buFontTx/>
-                        <a:buChar char="-"/>
-                      </a:pPr>
-                      <a:r>
-                        <a:rPr lang="ko-KR" altLang="en-US" dirty="0">
-                          <a:solidFill>
-                            <a:schemeClr val="accent6">
-                              <a:lumMod val="20000"/>
-                              <a:lumOff val="80000"/>
-                            </a:schemeClr>
-                          </a:solidFill>
-                          <a:latin typeface="배스킨라빈스 R" panose="02020603020101020101" pitchFamily="18" charset="-127"/>
-                          <a:ea typeface="배스킨라빈스 R" panose="02020603020101020101" pitchFamily="18" charset="-127"/>
-                        </a:rPr>
-                        <a:t>충돌 기반 함수와 연동 적합</a:t>
-                      </a:r>
-                      <a:endParaRPr lang="ko-KR" altLang="en-US" sz="1400" dirty="0">
-                        <a:solidFill>
-                          <a:schemeClr val="bg1">
-                            <a:lumMod val="95000"/>
-                          </a:schemeClr>
-                        </a:solidFill>
-                        <a:highlight>
-                          <a:srgbClr val="000000"/>
-                        </a:highlight>
-                        <a:latin typeface="나눔스퀘어OTF Bold" panose="020B0600000101010101" pitchFamily="34" charset="-127"/>
-                        <a:ea typeface="나눔스퀘어OTF Bold" panose="020B0600000101010101" pitchFamily="34" charset="-127"/>
-                      </a:endParaRPr>
-                    </a:p>
-                  </a:txBody>
-                  <a:tcPr anchor="ctr"/>
-                </a:tc>
-                <a:extLst>
-                  <a:ext uri="{0D108BD9-81ED-4DB2-BD59-A6C34878D82A}">
-                    <a16:rowId xmlns:a16="http://schemas.microsoft.com/office/drawing/2014/main" val="2817348084"/>
-                  </a:ext>
-                </a:extLst>
-              </a:tr>
-              <a:tr h="370840">
-                <a:tc>
-                  <a:txBody>
-                    <a:bodyPr/>
-                    <a:lstStyle/>
-                    <a:p>
-                      <a:pPr latinLnBrk="1"/>
-                      <a:r>
-                        <a:rPr lang="ko-KR" altLang="en-US" dirty="0">
-                          <a:solidFill>
-                            <a:schemeClr val="accent5">
-                              <a:lumMod val="20000"/>
-                              <a:lumOff val="80000"/>
-                            </a:schemeClr>
-                          </a:solidFill>
-                          <a:latin typeface="배스킨라빈스 R" panose="02020603020101020101" pitchFamily="18" charset="-127"/>
-                          <a:ea typeface="배스킨라빈스 R" panose="02020603020101020101" pitchFamily="18" charset="-127"/>
-                        </a:rPr>
-                        <a:t>단점</a:t>
-                      </a:r>
-                    </a:p>
-                  </a:txBody>
-                  <a:tcPr anchor="ctr"/>
-                </a:tc>
-                <a:tc>
-                  <a:txBody>
-                    <a:bodyPr/>
-                    <a:lstStyle/>
-                    <a:p>
-                      <a:pPr marL="285750" indent="-285750" latinLnBrk="1">
-                        <a:buFontTx/>
-                        <a:buChar char="-"/>
-                      </a:pPr>
-                      <a:r>
-                        <a:rPr lang="ko-KR" altLang="en-US" dirty="0">
-                          <a:solidFill>
-                            <a:schemeClr val="accent6">
-                              <a:lumMod val="20000"/>
-                              <a:lumOff val="80000"/>
-                            </a:schemeClr>
-                          </a:solidFill>
-                          <a:latin typeface="배스킨라빈스 R" panose="02020603020101020101" pitchFamily="18" charset="-127"/>
-                          <a:ea typeface="배스킨라빈스 R" panose="02020603020101020101" pitchFamily="18" charset="-127"/>
-                        </a:rPr>
-                        <a:t>물리와 동기화 안 됨</a:t>
-                      </a:r>
-                    </a:p>
-                  </a:txBody>
-                  <a:tcPr anchor="ctr"/>
-                </a:tc>
-                <a:tc>
-                  <a:txBody>
-                    <a:bodyPr/>
-                    <a:lstStyle/>
-                    <a:p>
-                      <a:pPr marL="285750" indent="-285750" latinLnBrk="1">
-                        <a:buFontTx/>
-                        <a:buChar char="-"/>
-                      </a:pPr>
-                      <a:r>
-                        <a:rPr lang="ko-KR" altLang="en-US" dirty="0">
-                          <a:solidFill>
-                            <a:schemeClr val="accent6">
-                              <a:lumMod val="20000"/>
-                              <a:lumOff val="80000"/>
-                            </a:schemeClr>
-                          </a:solidFill>
-                          <a:latin typeface="배스킨라빈스 R" panose="02020603020101020101" pitchFamily="18" charset="-127"/>
-                          <a:ea typeface="배스킨라빈스 R" panose="02020603020101020101" pitchFamily="18" charset="-127"/>
-                        </a:rPr>
-                        <a:t>시각적으로 덜 부드러울 수 있음</a:t>
-                      </a:r>
-                      <a:endParaRPr lang="en-US" altLang="ko-KR" dirty="0">
-                        <a:solidFill>
-                          <a:schemeClr val="accent6">
-                            <a:lumMod val="20000"/>
-                            <a:lumOff val="80000"/>
-                          </a:schemeClr>
-                        </a:solidFill>
-                        <a:latin typeface="배스킨라빈스 R" panose="02020603020101020101" pitchFamily="18" charset="-127"/>
-                        <a:ea typeface="배스킨라빈스 R" panose="02020603020101020101" pitchFamily="18" charset="-127"/>
-                      </a:endParaRPr>
-                    </a:p>
-                  </a:txBody>
-                  <a:tcPr anchor="ctr"/>
-                </a:tc>
-                <a:extLst>
-                  <a:ext uri="{0D108BD9-81ED-4DB2-BD59-A6C34878D82A}">
-                    <a16:rowId xmlns:a16="http://schemas.microsoft.com/office/drawing/2014/main" val="849694611"/>
-                  </a:ext>
-                </a:extLst>
-              </a:tr>
-            </a:tbl>
-          </a:graphicData>
-        </a:graphic>
-      </p:graphicFrame>
-    </p:spTree>
-    <p:extLst>
-      <p:ext uri="{BB962C8B-B14F-4D97-AF65-F5344CB8AC3E}">
-        <p14:creationId xmlns:p14="http://schemas.microsoft.com/office/powerpoint/2010/main" val="1750648743"/>
-      </p:ext>
-    </p:extLst>
-  </p:cSld>
-  <p:clrMapOvr>
-    <a:masterClrMapping/>
-  </p:clrMapOvr>
-</p:sld>
-</file>
-
-<file path=ppt/slides/slide5.xml><?xml version="1.0" encoding="utf-8"?>
-<p:sld xmlns:a="http://schemas.openxmlformats.org/drawingml/2006/main" xmlns:r="http://schemas.openxmlformats.org/officeDocument/2006/relationships" xmlns:p="http://schemas.openxmlformats.org/presentationml/2006/main">
-  <p:cSld>
-    <p:spTree>
-      <p:nvGrpSpPr>
-        <p:cNvPr id="1" name=""/>
-        <p:cNvGrpSpPr/>
-        <p:nvPr/>
-      </p:nvGrpSpPr>
-      <p:grpSpPr>
-        <a:xfrm>
-          <a:off x="0" y="0"/>
-          <a:ext cx="0" cy="0"/>
-          <a:chOff x="0" y="0"/>
-          <a:chExt cx="0" cy="0"/>
-        </a:xfrm>
-      </p:grpSpPr>
-      <p:sp>
-        <p:nvSpPr>
-          <p:cNvPr id="15" name="직사각형 14">
-            <a:extLst>
-              <a:ext uri="{FF2B5EF4-FFF2-40B4-BE49-F238E27FC236}">
-                <a16:creationId xmlns:a16="http://schemas.microsoft.com/office/drawing/2014/main" id="{AC8DA9A0-646D-4BBC-865C-5347AEDE318F}"/>
-              </a:ext>
-            </a:extLst>
-          </p:cNvPr>
-          <p:cNvSpPr/>
-          <p:nvPr/>
-        </p:nvSpPr>
-        <p:spPr>
-          <a:xfrm>
-            <a:off x="0" y="0"/>
-            <a:ext cx="12192000" cy="6858000"/>
-          </a:xfrm>
-          <a:prstGeom prst="rect">
-            <a:avLst/>
-          </a:prstGeom>
-          <a:solidFill>
-            <a:srgbClr val="414042"/>
-          </a:solidFill>
-          <a:ln>
-            <a:noFill/>
-          </a:ln>
-        </p:spPr>
-        <p:style>
-          <a:lnRef idx="2">
-            <a:schemeClr val="accent1">
-              <a:shade val="50000"/>
-            </a:schemeClr>
-          </a:lnRef>
-          <a:fillRef idx="1">
-            <a:schemeClr val="accent1"/>
-          </a:fillRef>
-          <a:effectRef idx="0">
-            <a:schemeClr val="accent1"/>
-          </a:effectRef>
-          <a:fontRef idx="minor">
-            <a:schemeClr val="lt1"/>
-          </a:fontRef>
-        </p:style>
-        <p:txBody>
-          <a:bodyPr rtlCol="0" anchor="ctr"/>
-          <a:lstStyle/>
-          <a:p>
-            <a:pPr algn="ctr"/>
-            <a:endParaRPr lang="ko-KR" altLang="en-US"/>
-          </a:p>
-        </p:txBody>
-      </p:sp>
-      <p:sp>
-        <p:nvSpPr>
-          <p:cNvPr id="6" name="TextBox 5">
-            <a:extLst>
-              <a:ext uri="{FF2B5EF4-FFF2-40B4-BE49-F238E27FC236}">
-                <a16:creationId xmlns:a16="http://schemas.microsoft.com/office/drawing/2014/main" id="{2E003A48-463D-484B-B651-5AE44B5E8F60}"/>
-              </a:ext>
-            </a:extLst>
-          </p:cNvPr>
-          <p:cNvSpPr txBox="1"/>
-          <p:nvPr/>
-        </p:nvSpPr>
-        <p:spPr>
-          <a:xfrm>
-            <a:off x="2038805" y="2664619"/>
-            <a:ext cx="8114390" cy="2185214"/>
-          </a:xfrm>
-          <a:prstGeom prst="rect">
-            <a:avLst/>
-          </a:prstGeom>
-          <a:noFill/>
-        </p:spPr>
-        <p:txBody>
-          <a:bodyPr wrap="square">
-            <a:spAutoFit/>
-          </a:bodyPr>
-          <a:lstStyle/>
-          <a:p>
-            <a:r>
-              <a:rPr lang="en-US" altLang="ko-KR" sz="3200" dirty="0">
-                <a:solidFill>
-                  <a:schemeClr val="accent2">
-                    <a:lumMod val="60000"/>
-                    <a:lumOff val="40000"/>
-                  </a:schemeClr>
-                </a:solidFill>
-                <a:latin typeface="배스킨라빈스 R" panose="02020603020101020101" pitchFamily="18" charset="-127"/>
-                <a:ea typeface="배스킨라빈스 R" panose="02020603020101020101" pitchFamily="18" charset="-127"/>
-              </a:rPr>
-              <a:t>_process(delta)</a:t>
-            </a:r>
-          </a:p>
-          <a:p>
-            <a:pPr marL="342900" indent="-342900">
-              <a:buFontTx/>
-              <a:buChar char="-"/>
-            </a:pPr>
-            <a:r>
-              <a:rPr lang="ko-KR" altLang="en-US" sz="2400" dirty="0">
-                <a:solidFill>
-                  <a:schemeClr val="accent4">
-                    <a:lumMod val="60000"/>
-                    <a:lumOff val="40000"/>
-                  </a:schemeClr>
-                </a:solidFill>
-                <a:latin typeface="배스킨라빈스 R" panose="02020603020101020101" pitchFamily="18" charset="-127"/>
-                <a:ea typeface="배스킨라빈스 R" panose="02020603020101020101" pitchFamily="18" charset="-127"/>
-              </a:rPr>
-              <a:t>프레임마다 호출</a:t>
-            </a:r>
-            <a:r>
-              <a:rPr lang="ko-KR" altLang="en-US" sz="2400" dirty="0">
-                <a:solidFill>
-                  <a:schemeClr val="bg1"/>
-                </a:solidFill>
-                <a:latin typeface="배스킨라빈스 R" panose="02020603020101020101" pitchFamily="18" charset="-127"/>
-                <a:ea typeface="배스킨라빈스 R" panose="02020603020101020101" pitchFamily="18" charset="-127"/>
-              </a:rPr>
-              <a:t>되어 </a:t>
-            </a:r>
-            <a:r>
-              <a:rPr lang="en-US" altLang="ko-KR" sz="2400" dirty="0">
-                <a:solidFill>
-                  <a:schemeClr val="bg1"/>
-                </a:solidFill>
-                <a:latin typeface="배스킨라빈스 R" panose="02020603020101020101" pitchFamily="18" charset="-127"/>
-                <a:ea typeface="배스킨라빈스 R" panose="02020603020101020101" pitchFamily="18" charset="-127"/>
-              </a:rPr>
-              <a:t>UI</a:t>
-            </a:r>
-            <a:r>
-              <a:rPr lang="ko-KR" altLang="en-US" sz="2400" dirty="0">
-                <a:solidFill>
-                  <a:schemeClr val="bg1"/>
-                </a:solidFill>
-                <a:latin typeface="배스킨라빈스 R" panose="02020603020101020101" pitchFamily="18" charset="-127"/>
-                <a:ea typeface="배스킨라빈스 R" panose="02020603020101020101" pitchFamily="18" charset="-127"/>
-              </a:rPr>
-              <a:t>나 애니메이션 같은 </a:t>
-            </a:r>
-            <a:r>
-              <a:rPr lang="ko-KR" altLang="en-US" sz="2400" dirty="0">
-                <a:solidFill>
-                  <a:schemeClr val="accent4">
-                    <a:lumMod val="60000"/>
-                    <a:lumOff val="40000"/>
-                  </a:schemeClr>
-                </a:solidFill>
-                <a:latin typeface="배스킨라빈스 R" panose="02020603020101020101" pitchFamily="18" charset="-127"/>
-                <a:ea typeface="배스킨라빈스 R" panose="02020603020101020101" pitchFamily="18" charset="-127"/>
-              </a:rPr>
-              <a:t>비물리적 연산에 적합</a:t>
-            </a:r>
-            <a:endParaRPr lang="en-US" altLang="ko-KR" sz="2400" dirty="0">
-              <a:solidFill>
-                <a:schemeClr val="accent4">
-                  <a:lumMod val="60000"/>
-                  <a:lumOff val="40000"/>
-                </a:schemeClr>
-              </a:solidFill>
-              <a:latin typeface="배스킨라빈스 R" panose="02020603020101020101" pitchFamily="18" charset="-127"/>
-              <a:ea typeface="배스킨라빈스 R" panose="02020603020101020101" pitchFamily="18" charset="-127"/>
-            </a:endParaRPr>
-          </a:p>
-          <a:p>
-            <a:pPr marL="342900" indent="-342900">
-              <a:buFontTx/>
-              <a:buChar char="-"/>
-            </a:pPr>
-            <a:endParaRPr lang="en-US" altLang="ko-KR" sz="2400" dirty="0">
-              <a:solidFill>
-                <a:schemeClr val="bg1"/>
-              </a:solidFill>
-              <a:latin typeface="배스킨라빈스 R" panose="02020603020101020101" pitchFamily="18" charset="-127"/>
-              <a:ea typeface="배스킨라빈스 R" panose="02020603020101020101" pitchFamily="18" charset="-127"/>
-            </a:endParaRPr>
-          </a:p>
-          <a:p>
-            <a:r>
-              <a:rPr lang="en-US" altLang="ko-KR" sz="3200" dirty="0">
-                <a:solidFill>
-                  <a:schemeClr val="accent2">
-                    <a:lumMod val="60000"/>
-                    <a:lumOff val="40000"/>
-                  </a:schemeClr>
-                </a:solidFill>
-                <a:latin typeface="배스킨라빈스 R" panose="02020603020101020101" pitchFamily="18" charset="-127"/>
-                <a:ea typeface="배스킨라빈스 R" panose="02020603020101020101" pitchFamily="18" charset="-127"/>
-              </a:rPr>
-              <a:t>_</a:t>
-            </a:r>
-            <a:r>
-              <a:rPr lang="en-US" altLang="ko-KR" sz="3200" dirty="0" err="1">
-                <a:solidFill>
-                  <a:schemeClr val="accent2">
-                    <a:lumMod val="60000"/>
-                    <a:lumOff val="40000"/>
-                  </a:schemeClr>
-                </a:solidFill>
-                <a:latin typeface="배스킨라빈스 R" panose="02020603020101020101" pitchFamily="18" charset="-127"/>
-                <a:ea typeface="배스킨라빈스 R" panose="02020603020101020101" pitchFamily="18" charset="-127"/>
-              </a:rPr>
-              <a:t>physics_process</a:t>
-            </a:r>
-            <a:r>
-              <a:rPr lang="en-US" altLang="ko-KR" sz="3200" dirty="0">
-                <a:solidFill>
-                  <a:schemeClr val="accent2">
-                    <a:lumMod val="60000"/>
-                    <a:lumOff val="40000"/>
-                  </a:schemeClr>
-                </a:solidFill>
-                <a:latin typeface="배스킨라빈스 R" panose="02020603020101020101" pitchFamily="18" charset="-127"/>
-                <a:ea typeface="배스킨라빈스 R" panose="02020603020101020101" pitchFamily="18" charset="-127"/>
-              </a:rPr>
-              <a:t>(delta)</a:t>
-            </a:r>
-          </a:p>
-          <a:p>
-            <a:pPr marL="342900" indent="-342900">
-              <a:buFontTx/>
-              <a:buChar char="-"/>
-            </a:pPr>
-            <a:r>
-              <a:rPr lang="ko-KR" altLang="en-US" sz="2400" dirty="0">
-                <a:solidFill>
-                  <a:schemeClr val="bg1"/>
-                </a:solidFill>
-                <a:latin typeface="배스킨라빈스 R" panose="02020603020101020101" pitchFamily="18" charset="-127"/>
-                <a:ea typeface="배스킨라빈스 R" panose="02020603020101020101" pitchFamily="18" charset="-127"/>
-              </a:rPr>
-              <a:t>일정한 </a:t>
-            </a:r>
-            <a:r>
-              <a:rPr lang="ko-KR" altLang="en-US" sz="2400" dirty="0">
-                <a:solidFill>
-                  <a:schemeClr val="accent4">
-                    <a:lumMod val="60000"/>
-                    <a:lumOff val="40000"/>
-                  </a:schemeClr>
-                </a:solidFill>
-                <a:latin typeface="배스킨라빈스 R" panose="02020603020101020101" pitchFamily="18" charset="-127"/>
-                <a:ea typeface="배스킨라빈스 R" panose="02020603020101020101" pitchFamily="18" charset="-127"/>
-              </a:rPr>
-              <a:t>물리 프레임마다 호출</a:t>
-            </a:r>
-            <a:r>
-              <a:rPr lang="ko-KR" altLang="en-US" sz="2400" dirty="0">
-                <a:solidFill>
-                  <a:schemeClr val="bg1"/>
-                </a:solidFill>
-                <a:latin typeface="배스킨라빈스 R" panose="02020603020101020101" pitchFamily="18" charset="-127"/>
-                <a:ea typeface="배스킨라빈스 R" panose="02020603020101020101" pitchFamily="18" charset="-127"/>
-              </a:rPr>
-              <a:t>되어 이동</a:t>
-            </a:r>
-            <a:r>
-              <a:rPr lang="en-US" altLang="ko-KR" sz="2400" dirty="0">
-                <a:solidFill>
-                  <a:schemeClr val="bg1"/>
-                </a:solidFill>
-                <a:latin typeface="배스킨라빈스 R" panose="02020603020101020101" pitchFamily="18" charset="-127"/>
-                <a:ea typeface="배스킨라빈스 R" panose="02020603020101020101" pitchFamily="18" charset="-127"/>
-              </a:rPr>
-              <a:t>, </a:t>
-            </a:r>
-            <a:r>
-              <a:rPr lang="ko-KR" altLang="en-US" sz="2400" dirty="0">
-                <a:solidFill>
-                  <a:schemeClr val="bg1"/>
-                </a:solidFill>
-                <a:latin typeface="배스킨라빈스 R" panose="02020603020101020101" pitchFamily="18" charset="-127"/>
-                <a:ea typeface="배스킨라빈스 R" panose="02020603020101020101" pitchFamily="18" charset="-127"/>
-              </a:rPr>
-              <a:t>충돌 등 </a:t>
-            </a:r>
-            <a:r>
-              <a:rPr lang="ko-KR" altLang="en-US" sz="2400" dirty="0">
-                <a:solidFill>
-                  <a:schemeClr val="accent4">
-                    <a:lumMod val="60000"/>
-                    <a:lumOff val="40000"/>
-                  </a:schemeClr>
-                </a:solidFill>
-                <a:latin typeface="배스킨라빈스 R" panose="02020603020101020101" pitchFamily="18" charset="-127"/>
-                <a:ea typeface="배스킨라빈스 R" panose="02020603020101020101" pitchFamily="18" charset="-127"/>
-              </a:rPr>
-              <a:t>물리 연산에 적합</a:t>
-            </a:r>
-            <a:endParaRPr lang="en-US" altLang="ko-KR" sz="2400" dirty="0">
-              <a:solidFill>
-                <a:schemeClr val="bg1"/>
-              </a:solidFill>
-              <a:latin typeface="배스킨라빈스 R" panose="02020603020101020101" pitchFamily="18" charset="-127"/>
-              <a:ea typeface="배스킨라빈스 R" panose="02020603020101020101" pitchFamily="18" charset="-127"/>
-            </a:endParaRPr>
-          </a:p>
-        </p:txBody>
-      </p:sp>
-      <p:sp>
-        <p:nvSpPr>
-          <p:cNvPr id="2" name="TextBox 1">
-            <a:extLst>
-              <a:ext uri="{FF2B5EF4-FFF2-40B4-BE49-F238E27FC236}">
-                <a16:creationId xmlns:a16="http://schemas.microsoft.com/office/drawing/2014/main" id="{2B6A17E4-2DDB-4B93-9576-1F677FD33C74}"/>
-              </a:ext>
-            </a:extLst>
-          </p:cNvPr>
-          <p:cNvSpPr txBox="1"/>
-          <p:nvPr/>
-        </p:nvSpPr>
-        <p:spPr>
-          <a:xfrm>
-            <a:off x="5037066" y="397823"/>
-            <a:ext cx="2117887" cy="707886"/>
-          </a:xfrm>
-          <a:prstGeom prst="rect">
-            <a:avLst/>
-          </a:prstGeom>
-          <a:noFill/>
-        </p:spPr>
-        <p:txBody>
-          <a:bodyPr wrap="none" rtlCol="0">
-            <a:spAutoFit/>
-          </a:bodyPr>
-          <a:lstStyle/>
-          <a:p>
-            <a:pPr algn="ctr"/>
-            <a:r>
-              <a:rPr lang="ko-KR" altLang="en-US" sz="4000" dirty="0">
-                <a:solidFill>
-                  <a:schemeClr val="accent2">
-                    <a:lumMod val="60000"/>
-                    <a:lumOff val="40000"/>
-                  </a:schemeClr>
-                </a:solidFill>
-                <a:latin typeface="태나다체 " panose="02000000000000000000" pitchFamily="2" charset="-127"/>
-                <a:ea typeface="태나다체 " panose="02000000000000000000" pitchFamily="2" charset="-127"/>
-              </a:rPr>
-              <a:t>최종</a:t>
-            </a:r>
-            <a:r>
-              <a:rPr lang="en-US" altLang="ko-KR" sz="4000" dirty="0">
-                <a:solidFill>
-                  <a:schemeClr val="bg1"/>
-                </a:solidFill>
-                <a:latin typeface="태나다체 " panose="02000000000000000000" pitchFamily="2" charset="-127"/>
-                <a:ea typeface="태나다체 " panose="02000000000000000000" pitchFamily="2" charset="-127"/>
-              </a:rPr>
-              <a:t> </a:t>
-            </a:r>
-            <a:r>
-              <a:rPr lang="ko-KR" altLang="en-US" sz="4000" dirty="0">
-                <a:solidFill>
-                  <a:schemeClr val="bg1"/>
-                </a:solidFill>
-                <a:latin typeface="태나다체 " panose="02000000000000000000" pitchFamily="2" charset="-127"/>
-                <a:ea typeface="태나다체 " panose="02000000000000000000" pitchFamily="2" charset="-127"/>
-              </a:rPr>
-              <a:t>정리</a:t>
-            </a:r>
-          </a:p>
-        </p:txBody>
-      </p:sp>
-      <p:pic>
-        <p:nvPicPr>
-          <p:cNvPr id="14" name="그림 13">
-            <a:extLst>
-              <a:ext uri="{FF2B5EF4-FFF2-40B4-BE49-F238E27FC236}">
-                <a16:creationId xmlns:a16="http://schemas.microsoft.com/office/drawing/2014/main" id="{057A1348-A3CE-4DA5-9D84-5DB18862A61E}"/>
-              </a:ext>
-            </a:extLst>
-          </p:cNvPr>
-          <p:cNvPicPr>
-            <a:picLocks noChangeAspect="1"/>
-          </p:cNvPicPr>
-          <p:nvPr/>
-        </p:nvPicPr>
-        <p:blipFill>
-          <a:blip r:embed="rId2">
-            <a:extLst>
-              <a:ext uri="{28A0092B-C50C-407E-A947-70E740481C1C}">
-                <a14:useLocalDpi xmlns:a14="http://schemas.microsoft.com/office/drawing/2010/main" val="0"/>
-              </a:ext>
-            </a:extLst>
-          </a:blip>
-          <a:stretch>
-            <a:fillRect/>
-          </a:stretch>
-        </p:blipFill>
-        <p:spPr>
-          <a:xfrm rot="1835132">
-            <a:off x="-1679702" y="-1168087"/>
-            <a:ext cx="2741223" cy="2741223"/>
-          </a:xfrm>
-          <a:prstGeom prst="rect">
-            <a:avLst/>
-          </a:prstGeom>
-        </p:spPr>
-      </p:pic>
-      <p:pic>
-        <p:nvPicPr>
-          <p:cNvPr id="13" name="그림 12">
-            <a:extLst>
-              <a:ext uri="{FF2B5EF4-FFF2-40B4-BE49-F238E27FC236}">
-                <a16:creationId xmlns:a16="http://schemas.microsoft.com/office/drawing/2014/main" id="{4D86BD98-BEF1-4770-8C54-2A0C065ABC5B}"/>
-              </a:ext>
-            </a:extLst>
-          </p:cNvPr>
-          <p:cNvPicPr>
-            <a:picLocks noChangeAspect="1"/>
-          </p:cNvPicPr>
-          <p:nvPr/>
-        </p:nvPicPr>
-        <p:blipFill>
-          <a:blip r:embed="rId2">
-            <a:extLst>
-              <a:ext uri="{28A0092B-C50C-407E-A947-70E740481C1C}">
-                <a14:useLocalDpi xmlns:a14="http://schemas.microsoft.com/office/drawing/2010/main" val="0"/>
-              </a:ext>
-            </a:extLst>
-          </a:blip>
-          <a:stretch>
-            <a:fillRect/>
-          </a:stretch>
-        </p:blipFill>
-        <p:spPr>
-          <a:xfrm rot="1835132">
-            <a:off x="10618517" y="4947062"/>
-            <a:ext cx="2741223" cy="2741223"/>
-          </a:xfrm>
-          <a:prstGeom prst="rect">
-            <a:avLst/>
-          </a:prstGeom>
-        </p:spPr>
-      </p:pic>
-    </p:spTree>
-    <p:extLst>
-      <p:ext uri="{BB962C8B-B14F-4D97-AF65-F5344CB8AC3E}">
-        <p14:creationId xmlns:p14="http://schemas.microsoft.com/office/powerpoint/2010/main" val="853339389"/>
-      </p:ext>
-    </p:extLst>
-  </p:cSld>
-  <p:clrMapOvr>
-    <a:masterClrMapping/>
-  </p:clrMapOvr>
-</p:sld>
-</file>
-
 <file path=ppt/theme/theme1.xml><?xml version="1.0" encoding="utf-8"?>
 <a:theme xmlns:a="http://schemas.openxmlformats.org/drawingml/2006/main" name="Office 테마">
   <a:themeElements>

</xml_diff>